<commit_message>
Update exercise ppt and run_mesh script
</commit_message>
<xml_diff>
--- a/Presentations/White Gull Creek MESH Point Scale Configuration.pptx
+++ b/Presentations/White Gull Creek MESH Point Scale Configuration.pptx
@@ -4,6 +4,9 @@
   <p:sldMasterIdLst>
     <p:sldMasterId id="2147483648" r:id="rId4"/>
   </p:sldMasterIdLst>
+  <p:notesMasterIdLst>
+    <p:notesMasterId r:id="rId19"/>
+  </p:notesMasterIdLst>
   <p:sldIdLst>
     <p:sldId id="256" r:id="rId5"/>
     <p:sldId id="257" r:id="rId6"/>
@@ -12,12 +15,13 @@
     <p:sldId id="260" r:id="rId9"/>
     <p:sldId id="267" r:id="rId10"/>
     <p:sldId id="268" r:id="rId11"/>
-    <p:sldId id="262" r:id="rId12"/>
-    <p:sldId id="263" r:id="rId13"/>
-    <p:sldId id="264" r:id="rId14"/>
-    <p:sldId id="265" r:id="rId15"/>
-    <p:sldId id="266" r:id="rId16"/>
-    <p:sldId id="261" r:id="rId17"/>
+    <p:sldId id="269" r:id="rId12"/>
+    <p:sldId id="262" r:id="rId13"/>
+    <p:sldId id="263" r:id="rId14"/>
+    <p:sldId id="264" r:id="rId15"/>
+    <p:sldId id="265" r:id="rId16"/>
+    <p:sldId id="266" r:id="rId17"/>
+    <p:sldId id="261" r:id="rId18"/>
   </p:sldIdLst>
   <p:sldSz cx="12192000" cy="6858000"/>
   <p:notesSz cx="6858000" cy="9144000"/>
@@ -124,6 +128,574 @@
 </p:presentation>
 </file>
 
+<file path=ppt/notesMasters/notesMaster1.xml><?xml version="1.0" encoding="utf-8"?>
+<p:notesMaster xmlns:a="http://schemas.openxmlformats.org/drawingml/2006/main" xmlns:r="http://schemas.openxmlformats.org/officeDocument/2006/relationships" xmlns:p="http://schemas.openxmlformats.org/presentationml/2006/main">
+  <p:cSld>
+    <p:bg>
+      <p:bgRef idx="1001">
+        <a:schemeClr val="bg1"/>
+      </p:bgRef>
+    </p:bg>
+    <p:spTree>
+      <p:nvGrpSpPr>
+        <p:cNvPr id="1" name=""/>
+        <p:cNvGrpSpPr/>
+        <p:nvPr/>
+      </p:nvGrpSpPr>
+      <p:grpSpPr>
+        <a:xfrm>
+          <a:off x="0" y="0"/>
+          <a:ext cx="0" cy="0"/>
+          <a:chOff x="0" y="0"/>
+          <a:chExt cx="0" cy="0"/>
+        </a:xfrm>
+      </p:grpSpPr>
+      <p:sp>
+        <p:nvSpPr>
+          <p:cNvPr id="2" name="Header Placeholder 1"/>
+          <p:cNvSpPr>
+            <a:spLocks noGrp="1"/>
+          </p:cNvSpPr>
+          <p:nvPr>
+            <p:ph type="hdr" sz="quarter"/>
+          </p:nvPr>
+        </p:nvSpPr>
+        <p:spPr>
+          <a:xfrm>
+            <a:off x="0" y="0"/>
+            <a:ext cx="2971800" cy="458788"/>
+          </a:xfrm>
+          <a:prstGeom prst="rect">
+            <a:avLst/>
+          </a:prstGeom>
+        </p:spPr>
+        <p:txBody>
+          <a:bodyPr vert="horz" lIns="91440" tIns="45720" rIns="91440" bIns="45720" rtlCol="0"/>
+          <a:lstStyle>
+            <a:lvl1pPr algn="l">
+              <a:defRPr sz="1200"/>
+            </a:lvl1pPr>
+          </a:lstStyle>
+          <a:p>
+            <a:endParaRPr lang="en-CA"/>
+          </a:p>
+        </p:txBody>
+      </p:sp>
+      <p:sp>
+        <p:nvSpPr>
+          <p:cNvPr id="3" name="Date Placeholder 2"/>
+          <p:cNvSpPr>
+            <a:spLocks noGrp="1"/>
+          </p:cNvSpPr>
+          <p:nvPr>
+            <p:ph type="dt" idx="1"/>
+          </p:nvPr>
+        </p:nvSpPr>
+        <p:spPr>
+          <a:xfrm>
+            <a:off x="3884613" y="0"/>
+            <a:ext cx="2971800" cy="458788"/>
+          </a:xfrm>
+          <a:prstGeom prst="rect">
+            <a:avLst/>
+          </a:prstGeom>
+        </p:spPr>
+        <p:txBody>
+          <a:bodyPr vert="horz" lIns="91440" tIns="45720" rIns="91440" bIns="45720" rtlCol="0"/>
+          <a:lstStyle>
+            <a:lvl1pPr algn="r">
+              <a:defRPr sz="1200"/>
+            </a:lvl1pPr>
+          </a:lstStyle>
+          <a:p>
+            <a:fld id="{1A552B27-DB50-4F36-8DFC-AF516C2E42A6}" type="datetimeFigureOut">
+              <a:rPr lang="en-CA" smtClean="0"/>
+              <a:t>2020-01-20</a:t>
+            </a:fld>
+            <a:endParaRPr lang="en-CA"/>
+          </a:p>
+        </p:txBody>
+      </p:sp>
+      <p:sp>
+        <p:nvSpPr>
+          <p:cNvPr id="4" name="Slide Image Placeholder 3"/>
+          <p:cNvSpPr>
+            <a:spLocks noGrp="1" noRot="1" noChangeAspect="1"/>
+          </p:cNvSpPr>
+          <p:nvPr>
+            <p:ph type="sldImg" idx="2"/>
+          </p:nvPr>
+        </p:nvSpPr>
+        <p:spPr>
+          <a:xfrm>
+            <a:off x="685800" y="1143000"/>
+            <a:ext cx="5486400" cy="3086100"/>
+          </a:xfrm>
+          <a:prstGeom prst="rect">
+            <a:avLst/>
+          </a:prstGeom>
+          <a:noFill/>
+          <a:ln w="12700">
+            <a:solidFill>
+              <a:prstClr val="black"/>
+            </a:solidFill>
+          </a:ln>
+        </p:spPr>
+        <p:txBody>
+          <a:bodyPr vert="horz" lIns="91440" tIns="45720" rIns="91440" bIns="45720" rtlCol="0" anchor="ctr"/>
+          <a:lstStyle/>
+          <a:p>
+            <a:endParaRPr lang="en-CA"/>
+          </a:p>
+        </p:txBody>
+      </p:sp>
+      <p:sp>
+        <p:nvSpPr>
+          <p:cNvPr id="5" name="Notes Placeholder 4"/>
+          <p:cNvSpPr>
+            <a:spLocks noGrp="1"/>
+          </p:cNvSpPr>
+          <p:nvPr>
+            <p:ph type="body" sz="quarter" idx="3"/>
+          </p:nvPr>
+        </p:nvSpPr>
+        <p:spPr>
+          <a:xfrm>
+            <a:off x="685800" y="4400550"/>
+            <a:ext cx="5486400" cy="3600450"/>
+          </a:xfrm>
+          <a:prstGeom prst="rect">
+            <a:avLst/>
+          </a:prstGeom>
+        </p:spPr>
+        <p:txBody>
+          <a:bodyPr vert="horz" lIns="91440" tIns="45720" rIns="91440" bIns="45720" rtlCol="0"/>
+          <a:lstStyle/>
+          <a:p>
+            <a:pPr lvl="0"/>
+            <a:r>
+              <a:rPr lang="en-US" smtClean="0"/>
+              <a:t>Edit Master text styles</a:t>
+            </a:r>
+          </a:p>
+          <a:p>
+            <a:pPr lvl="1"/>
+            <a:r>
+              <a:rPr lang="en-US" smtClean="0"/>
+              <a:t>Second level</a:t>
+            </a:r>
+          </a:p>
+          <a:p>
+            <a:pPr lvl="2"/>
+            <a:r>
+              <a:rPr lang="en-US" smtClean="0"/>
+              <a:t>Third level</a:t>
+            </a:r>
+          </a:p>
+          <a:p>
+            <a:pPr lvl="3"/>
+            <a:r>
+              <a:rPr lang="en-US" smtClean="0"/>
+              <a:t>Fourth level</a:t>
+            </a:r>
+          </a:p>
+          <a:p>
+            <a:pPr lvl="4"/>
+            <a:r>
+              <a:rPr lang="en-US" smtClean="0"/>
+              <a:t>Fifth level</a:t>
+            </a:r>
+            <a:endParaRPr lang="en-CA"/>
+          </a:p>
+        </p:txBody>
+      </p:sp>
+      <p:sp>
+        <p:nvSpPr>
+          <p:cNvPr id="6" name="Footer Placeholder 5"/>
+          <p:cNvSpPr>
+            <a:spLocks noGrp="1"/>
+          </p:cNvSpPr>
+          <p:nvPr>
+            <p:ph type="ftr" sz="quarter" idx="4"/>
+          </p:nvPr>
+        </p:nvSpPr>
+        <p:spPr>
+          <a:xfrm>
+            <a:off x="0" y="8685213"/>
+            <a:ext cx="2971800" cy="458787"/>
+          </a:xfrm>
+          <a:prstGeom prst="rect">
+            <a:avLst/>
+          </a:prstGeom>
+        </p:spPr>
+        <p:txBody>
+          <a:bodyPr vert="horz" lIns="91440" tIns="45720" rIns="91440" bIns="45720" rtlCol="0" anchor="b"/>
+          <a:lstStyle>
+            <a:lvl1pPr algn="l">
+              <a:defRPr sz="1200"/>
+            </a:lvl1pPr>
+          </a:lstStyle>
+          <a:p>
+            <a:endParaRPr lang="en-CA"/>
+          </a:p>
+        </p:txBody>
+      </p:sp>
+      <p:sp>
+        <p:nvSpPr>
+          <p:cNvPr id="7" name="Slide Number Placeholder 6"/>
+          <p:cNvSpPr>
+            <a:spLocks noGrp="1"/>
+          </p:cNvSpPr>
+          <p:nvPr>
+            <p:ph type="sldNum" sz="quarter" idx="5"/>
+          </p:nvPr>
+        </p:nvSpPr>
+        <p:spPr>
+          <a:xfrm>
+            <a:off x="3884613" y="8685213"/>
+            <a:ext cx="2971800" cy="458787"/>
+          </a:xfrm>
+          <a:prstGeom prst="rect">
+            <a:avLst/>
+          </a:prstGeom>
+        </p:spPr>
+        <p:txBody>
+          <a:bodyPr vert="horz" lIns="91440" tIns="45720" rIns="91440" bIns="45720" rtlCol="0" anchor="b"/>
+          <a:lstStyle>
+            <a:lvl1pPr algn="r">
+              <a:defRPr sz="1200"/>
+            </a:lvl1pPr>
+          </a:lstStyle>
+          <a:p>
+            <a:fld id="{88A4D26D-0930-4A42-8F11-EE49AF543FED}" type="slidenum">
+              <a:rPr lang="en-CA" smtClean="0"/>
+              <a:t>‹#›</a:t>
+            </a:fld>
+            <a:endParaRPr lang="en-CA"/>
+          </a:p>
+        </p:txBody>
+      </p:sp>
+    </p:spTree>
+    <p:extLst>
+      <p:ext uri="{BB962C8B-B14F-4D97-AF65-F5344CB8AC3E}">
+        <p14:creationId xmlns:p14="http://schemas.microsoft.com/office/powerpoint/2010/main" val="838451690"/>
+      </p:ext>
+    </p:extLst>
+  </p:cSld>
+  <p:clrMap bg1="lt1" tx1="dk1" bg2="lt2" tx2="dk2" accent1="accent1" accent2="accent2" accent3="accent3" accent4="accent4" accent5="accent5" accent6="accent6" hlink="hlink" folHlink="folHlink"/>
+  <p:notesStyle>
+    <a:lvl1pPr marL="0" algn="l" defTabSz="914400" rtl="0" eaLnBrk="1" latinLnBrk="0" hangingPunct="1">
+      <a:defRPr sz="1200" kern="1200">
+        <a:solidFill>
+          <a:schemeClr val="tx1"/>
+        </a:solidFill>
+        <a:latin typeface="+mn-lt"/>
+        <a:ea typeface="+mn-ea"/>
+        <a:cs typeface="+mn-cs"/>
+      </a:defRPr>
+    </a:lvl1pPr>
+    <a:lvl2pPr marL="457200" algn="l" defTabSz="914400" rtl="0" eaLnBrk="1" latinLnBrk="0" hangingPunct="1">
+      <a:defRPr sz="1200" kern="1200">
+        <a:solidFill>
+          <a:schemeClr val="tx1"/>
+        </a:solidFill>
+        <a:latin typeface="+mn-lt"/>
+        <a:ea typeface="+mn-ea"/>
+        <a:cs typeface="+mn-cs"/>
+      </a:defRPr>
+    </a:lvl2pPr>
+    <a:lvl3pPr marL="914400" algn="l" defTabSz="914400" rtl="0" eaLnBrk="1" latinLnBrk="0" hangingPunct="1">
+      <a:defRPr sz="1200" kern="1200">
+        <a:solidFill>
+          <a:schemeClr val="tx1"/>
+        </a:solidFill>
+        <a:latin typeface="+mn-lt"/>
+        <a:ea typeface="+mn-ea"/>
+        <a:cs typeface="+mn-cs"/>
+      </a:defRPr>
+    </a:lvl3pPr>
+    <a:lvl4pPr marL="1371600" algn="l" defTabSz="914400" rtl="0" eaLnBrk="1" latinLnBrk="0" hangingPunct="1">
+      <a:defRPr sz="1200" kern="1200">
+        <a:solidFill>
+          <a:schemeClr val="tx1"/>
+        </a:solidFill>
+        <a:latin typeface="+mn-lt"/>
+        <a:ea typeface="+mn-ea"/>
+        <a:cs typeface="+mn-cs"/>
+      </a:defRPr>
+    </a:lvl4pPr>
+    <a:lvl5pPr marL="1828800" algn="l" defTabSz="914400" rtl="0" eaLnBrk="1" latinLnBrk="0" hangingPunct="1">
+      <a:defRPr sz="1200" kern="1200">
+        <a:solidFill>
+          <a:schemeClr val="tx1"/>
+        </a:solidFill>
+        <a:latin typeface="+mn-lt"/>
+        <a:ea typeface="+mn-ea"/>
+        <a:cs typeface="+mn-cs"/>
+      </a:defRPr>
+    </a:lvl5pPr>
+    <a:lvl6pPr marL="2286000" algn="l" defTabSz="914400" rtl="0" eaLnBrk="1" latinLnBrk="0" hangingPunct="1">
+      <a:defRPr sz="1200" kern="1200">
+        <a:solidFill>
+          <a:schemeClr val="tx1"/>
+        </a:solidFill>
+        <a:latin typeface="+mn-lt"/>
+        <a:ea typeface="+mn-ea"/>
+        <a:cs typeface="+mn-cs"/>
+      </a:defRPr>
+    </a:lvl6pPr>
+    <a:lvl7pPr marL="2743200" algn="l" defTabSz="914400" rtl="0" eaLnBrk="1" latinLnBrk="0" hangingPunct="1">
+      <a:defRPr sz="1200" kern="1200">
+        <a:solidFill>
+          <a:schemeClr val="tx1"/>
+        </a:solidFill>
+        <a:latin typeface="+mn-lt"/>
+        <a:ea typeface="+mn-ea"/>
+        <a:cs typeface="+mn-cs"/>
+      </a:defRPr>
+    </a:lvl7pPr>
+    <a:lvl8pPr marL="3200400" algn="l" defTabSz="914400" rtl="0" eaLnBrk="1" latinLnBrk="0" hangingPunct="1">
+      <a:defRPr sz="1200" kern="1200">
+        <a:solidFill>
+          <a:schemeClr val="tx1"/>
+        </a:solidFill>
+        <a:latin typeface="+mn-lt"/>
+        <a:ea typeface="+mn-ea"/>
+        <a:cs typeface="+mn-cs"/>
+      </a:defRPr>
+    </a:lvl8pPr>
+    <a:lvl9pPr marL="3657600" algn="l" defTabSz="914400" rtl="0" eaLnBrk="1" latinLnBrk="0" hangingPunct="1">
+      <a:defRPr sz="1200" kern="1200">
+        <a:solidFill>
+          <a:schemeClr val="tx1"/>
+        </a:solidFill>
+        <a:latin typeface="+mn-lt"/>
+        <a:ea typeface="+mn-ea"/>
+        <a:cs typeface="+mn-cs"/>
+      </a:defRPr>
+    </a:lvl9pPr>
+  </p:notesStyle>
+</p:notesMaster>
+</file>
+
+<file path=ppt/notesSlides/notesSlide1.xml><?xml version="1.0" encoding="utf-8"?>
+<p:notes xmlns:a="http://schemas.openxmlformats.org/drawingml/2006/main" xmlns:r="http://schemas.openxmlformats.org/officeDocument/2006/relationships" xmlns:p="http://schemas.openxmlformats.org/presentationml/2006/main">
+  <p:cSld>
+    <p:spTree>
+      <p:nvGrpSpPr>
+        <p:cNvPr id="1" name=""/>
+        <p:cNvGrpSpPr/>
+        <p:nvPr/>
+      </p:nvGrpSpPr>
+      <p:grpSpPr>
+        <a:xfrm>
+          <a:off x="0" y="0"/>
+          <a:ext cx="0" cy="0"/>
+          <a:chOff x="0" y="0"/>
+          <a:chExt cx="0" cy="0"/>
+        </a:xfrm>
+      </p:grpSpPr>
+      <p:sp>
+        <p:nvSpPr>
+          <p:cNvPr id="2" name="Slide Image Placeholder 1"/>
+          <p:cNvSpPr>
+            <a:spLocks noGrp="1" noRot="1" noChangeAspect="1"/>
+          </p:cNvSpPr>
+          <p:nvPr>
+            <p:ph type="sldImg"/>
+          </p:nvPr>
+        </p:nvSpPr>
+        <p:spPr/>
+      </p:sp>
+      <p:sp>
+        <p:nvSpPr>
+          <p:cNvPr id="3" name="Notes Placeholder 2"/>
+          <p:cNvSpPr>
+            <a:spLocks noGrp="1"/>
+          </p:cNvSpPr>
+          <p:nvPr>
+            <p:ph type="body" idx="1"/>
+          </p:nvPr>
+        </p:nvSpPr>
+        <p:spPr/>
+        <p:txBody>
+          <a:bodyPr/>
+          <a:lstStyle/>
+          <a:p>
+            <a:r>
+              <a:rPr lang="en-US" dirty="0" smtClean="0"/>
+              <a:t>Steps</a:t>
+            </a:r>
+            <a:r>
+              <a:rPr lang="en-US" baseline="0" dirty="0" smtClean="0"/>
+              <a:t> followed:</a:t>
+            </a:r>
+          </a:p>
+          <a:p>
+            <a:pPr marL="171450" indent="-171450">
+              <a:buFontTx/>
+              <a:buChar char="-"/>
+            </a:pPr>
+            <a:r>
+              <a:rPr lang="en-US" baseline="0" dirty="0" smtClean="0"/>
+              <a:t>Downloaded the files</a:t>
+            </a:r>
+          </a:p>
+          <a:p>
+            <a:pPr marL="171450" indent="-171450">
+              <a:buFontTx/>
+              <a:buChar char="-"/>
+            </a:pPr>
+            <a:r>
+              <a:rPr lang="en-US" dirty="0" smtClean="0"/>
+              <a:t>Wrote</a:t>
+            </a:r>
+            <a:r>
+              <a:rPr lang="en-US" baseline="0" dirty="0" smtClean="0"/>
+              <a:t> code in the </a:t>
+            </a:r>
+            <a:r>
+              <a:rPr lang="en-US" baseline="0" dirty="0" err="1" smtClean="0"/>
+              <a:t>jupyter</a:t>
+            </a:r>
+            <a:r>
+              <a:rPr lang="en-US" baseline="0" dirty="0" smtClean="0"/>
+              <a:t> notebook to examine, process, and write to file the data for each variable</a:t>
+            </a:r>
+          </a:p>
+        </p:txBody>
+      </p:sp>
+      <p:sp>
+        <p:nvSpPr>
+          <p:cNvPr id="4" name="Slide Number Placeholder 3"/>
+          <p:cNvSpPr>
+            <a:spLocks noGrp="1"/>
+          </p:cNvSpPr>
+          <p:nvPr>
+            <p:ph type="sldNum" sz="quarter" idx="10"/>
+          </p:nvPr>
+        </p:nvSpPr>
+        <p:spPr/>
+        <p:txBody>
+          <a:bodyPr/>
+          <a:lstStyle/>
+          <a:p>
+            <a:fld id="{88A4D26D-0930-4A42-8F11-EE49AF543FED}" type="slidenum">
+              <a:rPr lang="en-CA" smtClean="0"/>
+              <a:t>4</a:t>
+            </a:fld>
+            <a:endParaRPr lang="en-CA"/>
+          </a:p>
+        </p:txBody>
+      </p:sp>
+    </p:spTree>
+    <p:extLst>
+      <p:ext uri="{BB962C8B-B14F-4D97-AF65-F5344CB8AC3E}">
+        <p14:creationId xmlns:p14="http://schemas.microsoft.com/office/powerpoint/2010/main" val="3086595172"/>
+      </p:ext>
+    </p:extLst>
+  </p:cSld>
+  <p:clrMapOvr>
+    <a:masterClrMapping/>
+  </p:clrMapOvr>
+</p:notes>
+</file>
+
+<file path=ppt/notesSlides/notesSlide2.xml><?xml version="1.0" encoding="utf-8"?>
+<p:notes xmlns:a="http://schemas.openxmlformats.org/drawingml/2006/main" xmlns:r="http://schemas.openxmlformats.org/officeDocument/2006/relationships" xmlns:p="http://schemas.openxmlformats.org/presentationml/2006/main">
+  <p:cSld>
+    <p:spTree>
+      <p:nvGrpSpPr>
+        <p:cNvPr id="1" name=""/>
+        <p:cNvGrpSpPr/>
+        <p:nvPr/>
+      </p:nvGrpSpPr>
+      <p:grpSpPr>
+        <a:xfrm>
+          <a:off x="0" y="0"/>
+          <a:ext cx="0" cy="0"/>
+          <a:chOff x="0" y="0"/>
+          <a:chExt cx="0" cy="0"/>
+        </a:xfrm>
+      </p:grpSpPr>
+      <p:sp>
+        <p:nvSpPr>
+          <p:cNvPr id="2" name="Slide Image Placeholder 1"/>
+          <p:cNvSpPr>
+            <a:spLocks noGrp="1" noRot="1" noChangeAspect="1"/>
+          </p:cNvSpPr>
+          <p:nvPr>
+            <p:ph type="sldImg"/>
+          </p:nvPr>
+        </p:nvSpPr>
+        <p:spPr/>
+      </p:sp>
+      <p:sp>
+        <p:nvSpPr>
+          <p:cNvPr id="3" name="Notes Placeholder 2"/>
+          <p:cNvSpPr>
+            <a:spLocks noGrp="1"/>
+          </p:cNvSpPr>
+          <p:nvPr>
+            <p:ph type="body" idx="1"/>
+          </p:nvPr>
+        </p:nvSpPr>
+        <p:spPr/>
+        <p:txBody>
+          <a:bodyPr/>
+          <a:lstStyle/>
+          <a:p>
+            <a:pPr marL="171450" indent="-171450">
+              <a:buFontTx/>
+              <a:buChar char="-"/>
+            </a:pPr>
+            <a:r>
+              <a:rPr lang="en-US" dirty="0" smtClean="0"/>
+              <a:t>Model start date: October 1, 1998</a:t>
+            </a:r>
+            <a:r>
+              <a:rPr lang="en-US" baseline="0" dirty="0" smtClean="0"/>
+              <a:t> (since don’t have soil temp or moisture data for 1997-10-01)</a:t>
+            </a:r>
+          </a:p>
+        </p:txBody>
+      </p:sp>
+      <p:sp>
+        <p:nvSpPr>
+          <p:cNvPr id="4" name="Slide Number Placeholder 3"/>
+          <p:cNvSpPr>
+            <a:spLocks noGrp="1"/>
+          </p:cNvSpPr>
+          <p:nvPr>
+            <p:ph type="sldNum" sz="quarter" idx="10"/>
+          </p:nvPr>
+        </p:nvSpPr>
+        <p:spPr/>
+        <p:txBody>
+          <a:bodyPr/>
+          <a:lstStyle/>
+          <a:p>
+            <a:fld id="{88A4D26D-0930-4A42-8F11-EE49AF543FED}" type="slidenum">
+              <a:rPr lang="en-CA" smtClean="0"/>
+              <a:t>6</a:t>
+            </a:fld>
+            <a:endParaRPr lang="en-CA"/>
+          </a:p>
+        </p:txBody>
+      </p:sp>
+    </p:spTree>
+    <p:extLst>
+      <p:ext uri="{BB962C8B-B14F-4D97-AF65-F5344CB8AC3E}">
+        <p14:creationId xmlns:p14="http://schemas.microsoft.com/office/powerpoint/2010/main" val="2323560755"/>
+      </p:ext>
+    </p:extLst>
+  </p:cSld>
+  <p:clrMapOvr>
+    <a:masterClrMapping/>
+  </p:clrMapOvr>
+</p:notes>
+</file>
+
 <file path=ppt/slideLayouts/slideLayout1.xml><?xml version="1.0" encoding="utf-8"?>
 <p:sldLayout xmlns:a="http://schemas.openxmlformats.org/drawingml/2006/main" xmlns:r="http://schemas.openxmlformats.org/officeDocument/2006/relationships" xmlns:p="http://schemas.openxmlformats.org/presentationml/2006/main" type="title" preserve="1">
   <p:cSld name="Title Slide">
@@ -255,7 +827,7 @@
           <a:p>
             <a:fld id="{A176C1FD-5F51-4E9E-88BE-6218115F035A}" type="datetimeFigureOut">
               <a:rPr lang="en-CA" smtClean="0"/>
-              <a:t>2020-01-16</a:t>
+              <a:t>2020-01-20</a:t>
             </a:fld>
             <a:endParaRPr lang="en-CA"/>
           </a:p>
@@ -425,7 +997,7 @@
           <a:p>
             <a:fld id="{A176C1FD-5F51-4E9E-88BE-6218115F035A}" type="datetimeFigureOut">
               <a:rPr lang="en-CA" smtClean="0"/>
-              <a:t>2020-01-16</a:t>
+              <a:t>2020-01-20</a:t>
             </a:fld>
             <a:endParaRPr lang="en-CA"/>
           </a:p>
@@ -605,7 +1177,7 @@
           <a:p>
             <a:fld id="{A176C1FD-5F51-4E9E-88BE-6218115F035A}" type="datetimeFigureOut">
               <a:rPr lang="en-CA" smtClean="0"/>
-              <a:t>2020-01-16</a:t>
+              <a:t>2020-01-20</a:t>
             </a:fld>
             <a:endParaRPr lang="en-CA"/>
           </a:p>
@@ -775,7 +1347,7 @@
           <a:p>
             <a:fld id="{A176C1FD-5F51-4E9E-88BE-6218115F035A}" type="datetimeFigureOut">
               <a:rPr lang="en-CA" smtClean="0"/>
-              <a:t>2020-01-16</a:t>
+              <a:t>2020-01-20</a:t>
             </a:fld>
             <a:endParaRPr lang="en-CA"/>
           </a:p>
@@ -1021,7 +1593,7 @@
           <a:p>
             <a:fld id="{A176C1FD-5F51-4E9E-88BE-6218115F035A}" type="datetimeFigureOut">
               <a:rPr lang="en-CA" smtClean="0"/>
-              <a:t>2020-01-16</a:t>
+              <a:t>2020-01-20</a:t>
             </a:fld>
             <a:endParaRPr lang="en-CA"/>
           </a:p>
@@ -1253,7 +1825,7 @@
           <a:p>
             <a:fld id="{A176C1FD-5F51-4E9E-88BE-6218115F035A}" type="datetimeFigureOut">
               <a:rPr lang="en-CA" smtClean="0"/>
-              <a:t>2020-01-16</a:t>
+              <a:t>2020-01-20</a:t>
             </a:fld>
             <a:endParaRPr lang="en-CA"/>
           </a:p>
@@ -1620,7 +2192,7 @@
           <a:p>
             <a:fld id="{A176C1FD-5F51-4E9E-88BE-6218115F035A}" type="datetimeFigureOut">
               <a:rPr lang="en-CA" smtClean="0"/>
-              <a:t>2020-01-16</a:t>
+              <a:t>2020-01-20</a:t>
             </a:fld>
             <a:endParaRPr lang="en-CA"/>
           </a:p>
@@ -1738,7 +2310,7 @@
           <a:p>
             <a:fld id="{A176C1FD-5F51-4E9E-88BE-6218115F035A}" type="datetimeFigureOut">
               <a:rPr lang="en-CA" smtClean="0"/>
-              <a:t>2020-01-16</a:t>
+              <a:t>2020-01-20</a:t>
             </a:fld>
             <a:endParaRPr lang="en-CA"/>
           </a:p>
@@ -1833,7 +2405,7 @@
           <a:p>
             <a:fld id="{A176C1FD-5F51-4E9E-88BE-6218115F035A}" type="datetimeFigureOut">
               <a:rPr lang="en-CA" smtClean="0"/>
-              <a:t>2020-01-16</a:t>
+              <a:t>2020-01-20</a:t>
             </a:fld>
             <a:endParaRPr lang="en-CA"/>
           </a:p>
@@ -2110,7 +2682,7 @@
           <a:p>
             <a:fld id="{A176C1FD-5F51-4E9E-88BE-6218115F035A}" type="datetimeFigureOut">
               <a:rPr lang="en-CA" smtClean="0"/>
-              <a:t>2020-01-16</a:t>
+              <a:t>2020-01-20</a:t>
             </a:fld>
             <a:endParaRPr lang="en-CA"/>
           </a:p>
@@ -2363,7 +2935,7 @@
           <a:p>
             <a:fld id="{A176C1FD-5F51-4E9E-88BE-6218115F035A}" type="datetimeFigureOut">
               <a:rPr lang="en-CA" smtClean="0"/>
-              <a:t>2020-01-16</a:t>
+              <a:t>2020-01-20</a:t>
             </a:fld>
             <a:endParaRPr lang="en-CA"/>
           </a:p>
@@ -2576,7 +3148,7 @@
           <a:p>
             <a:fld id="{A176C1FD-5F51-4E9E-88BE-6218115F035A}" type="datetimeFigureOut">
               <a:rPr lang="en-CA" smtClean="0"/>
-              <a:t>2020-01-16</a:t>
+              <a:t>2020-01-20</a:t>
             </a:fld>
             <a:endParaRPr lang="en-CA"/>
           </a:p>
@@ -2998,11 +3570,7 @@
           <a:p>
             <a:r>
               <a:rPr lang="en-US" dirty="0" smtClean="0"/>
-              <a:t>White Gull Creek MESH Point Scale </a:t>
-            </a:r>
-            <a:r>
-              <a:rPr lang="en-US" dirty="0" smtClean="0"/>
-              <a:t>Configuration Exercise</a:t>
+              <a:t>White Gull Creek MESH Point Scale Configuration Exercise</a:t>
             </a:r>
             <a:endParaRPr lang="en-CA" dirty="0"/>
           </a:p>
@@ -3045,6 +3613,800 @@
 </file>
 
 <file path=ppt/slides/slide10.xml><?xml version="1.0" encoding="utf-8"?>
+<p:sld xmlns:a="http://schemas.openxmlformats.org/drawingml/2006/main" xmlns:r="http://schemas.openxmlformats.org/officeDocument/2006/relationships" xmlns:p="http://schemas.openxmlformats.org/presentationml/2006/main">
+  <p:cSld>
+    <p:spTree>
+      <p:nvGrpSpPr>
+        <p:cNvPr id="1" name=""/>
+        <p:cNvGrpSpPr/>
+        <p:nvPr/>
+      </p:nvGrpSpPr>
+      <p:grpSpPr>
+        <a:xfrm>
+          <a:off x="0" y="0"/>
+          <a:ext cx="0" cy="0"/>
+          <a:chOff x="0" y="0"/>
+          <a:chExt cx="0" cy="0"/>
+        </a:xfrm>
+      </p:grpSpPr>
+      <p:pic>
+        <p:nvPicPr>
+          <p:cNvPr id="37" name="Picture 36">
+            <a:extLst>
+              <a:ext uri="{FF2B5EF4-FFF2-40B4-BE49-F238E27FC236}">
+                <a16:creationId xmlns:a16="http://schemas.microsoft.com/office/drawing/2014/main" id="{7D20F396-FC57-4471-B5B7-30BF98E86416}"/>
+              </a:ext>
+            </a:extLst>
+          </p:cNvPr>
+          <p:cNvPicPr>
+            <a:picLocks noChangeAspect="1"/>
+          </p:cNvPicPr>
+          <p:nvPr/>
+        </p:nvPicPr>
+        <p:blipFill>
+          <a:blip r:embed="rId2"/>
+          <a:stretch>
+            <a:fillRect/>
+          </a:stretch>
+        </p:blipFill>
+        <p:spPr>
+          <a:xfrm>
+            <a:off x="805168" y="2183746"/>
+            <a:ext cx="11370694" cy="3476926"/>
+          </a:xfrm>
+          <a:prstGeom prst="rect">
+            <a:avLst/>
+          </a:prstGeom>
+        </p:spPr>
+      </p:pic>
+      <p:sp>
+        <p:nvSpPr>
+          <p:cNvPr id="2" name="Title 1">
+            <a:extLst>
+              <a:ext uri="{FF2B5EF4-FFF2-40B4-BE49-F238E27FC236}">
+                <a16:creationId xmlns:a16="http://schemas.microsoft.com/office/drawing/2014/main" id="{98442713-896C-47B4-B7D0-7650989B73B1}"/>
+              </a:ext>
+            </a:extLst>
+          </p:cNvPr>
+          <p:cNvSpPr>
+            <a:spLocks noGrp="1"/>
+          </p:cNvSpPr>
+          <p:nvPr>
+            <p:ph type="title"/>
+          </p:nvPr>
+        </p:nvSpPr>
+        <p:spPr/>
+        <p:txBody>
+          <a:bodyPr/>
+          <a:lstStyle/>
+          <a:p>
+            <a:r>
+              <a:rPr lang="en-CA" dirty="0"/>
+              <a:t>MESH Model Files – CLASS.ini</a:t>
+            </a:r>
+          </a:p>
+        </p:txBody>
+      </p:sp>
+      <p:sp>
+        <p:nvSpPr>
+          <p:cNvPr id="16" name="TextBox 15">
+            <a:extLst>
+              <a:ext uri="{FF2B5EF4-FFF2-40B4-BE49-F238E27FC236}">
+                <a16:creationId xmlns:a16="http://schemas.microsoft.com/office/drawing/2014/main" id="{A52799F9-C401-41B8-9DA4-9D892FEAD414}"/>
+              </a:ext>
+            </a:extLst>
+          </p:cNvPr>
+          <p:cNvSpPr txBox="1"/>
+          <p:nvPr/>
+        </p:nvSpPr>
+        <p:spPr>
+          <a:xfrm>
+            <a:off x="-1" y="3150630"/>
+            <a:ext cx="797099" cy="400110"/>
+          </a:xfrm>
+          <a:prstGeom prst="rect">
+            <a:avLst/>
+          </a:prstGeom>
+          <a:noFill/>
+        </p:spPr>
+        <p:txBody>
+          <a:bodyPr wrap="square" rtlCol="0">
+            <a:spAutoFit/>
+          </a:bodyPr>
+          <a:lstStyle/>
+          <a:p>
+            <a:r>
+              <a:rPr lang="en-CA" sz="1000" dirty="0"/>
+              <a:t>Vegetation Parameters</a:t>
+            </a:r>
+          </a:p>
+        </p:txBody>
+      </p:sp>
+      <p:sp>
+        <p:nvSpPr>
+          <p:cNvPr id="3" name="Rectangle 2">
+            <a:extLst>
+              <a:ext uri="{FF2B5EF4-FFF2-40B4-BE49-F238E27FC236}">
+                <a16:creationId xmlns:a16="http://schemas.microsoft.com/office/drawing/2014/main" id="{E6C651E3-BB74-4519-8DD7-1A1559793A88}"/>
+              </a:ext>
+            </a:extLst>
+          </p:cNvPr>
+          <p:cNvSpPr/>
+          <p:nvPr/>
+        </p:nvSpPr>
+        <p:spPr>
+          <a:xfrm>
+            <a:off x="733097" y="2191017"/>
+            <a:ext cx="11441447" cy="678308"/>
+          </a:xfrm>
+          <a:prstGeom prst="rect">
+            <a:avLst/>
+          </a:prstGeom>
+          <a:solidFill>
+            <a:srgbClr val="FFFFFF">
+              <a:alpha val="69804"/>
+            </a:srgbClr>
+          </a:solidFill>
+          <a:ln>
+            <a:noFill/>
+          </a:ln>
+        </p:spPr>
+        <p:style>
+          <a:lnRef idx="2">
+            <a:schemeClr val="accent1">
+              <a:shade val="50000"/>
+            </a:schemeClr>
+          </a:lnRef>
+          <a:fillRef idx="1">
+            <a:schemeClr val="accent1"/>
+          </a:fillRef>
+          <a:effectRef idx="0">
+            <a:schemeClr val="accent1"/>
+          </a:effectRef>
+          <a:fontRef idx="minor">
+            <a:schemeClr val="lt1"/>
+          </a:fontRef>
+        </p:style>
+        <p:txBody>
+          <a:bodyPr rtlCol="0" anchor="ctr"/>
+          <a:lstStyle/>
+          <a:p>
+            <a:pPr algn="ctr"/>
+            <a:endParaRPr lang="en-CA"/>
+          </a:p>
+        </p:txBody>
+      </p:sp>
+      <p:sp>
+        <p:nvSpPr>
+          <p:cNvPr id="24" name="Rectangle 23">
+            <a:extLst>
+              <a:ext uri="{FF2B5EF4-FFF2-40B4-BE49-F238E27FC236}">
+                <a16:creationId xmlns:a16="http://schemas.microsoft.com/office/drawing/2014/main" id="{BC216150-2CD4-4162-B211-4F36A495A37F}"/>
+              </a:ext>
+            </a:extLst>
+          </p:cNvPr>
+          <p:cNvSpPr/>
+          <p:nvPr/>
+        </p:nvSpPr>
+        <p:spPr>
+          <a:xfrm>
+            <a:off x="685800" y="4202011"/>
+            <a:ext cx="11441447" cy="1494927"/>
+          </a:xfrm>
+          <a:prstGeom prst="rect">
+            <a:avLst/>
+          </a:prstGeom>
+          <a:solidFill>
+            <a:srgbClr val="FFFFFF">
+              <a:alpha val="69804"/>
+            </a:srgbClr>
+          </a:solidFill>
+          <a:ln>
+            <a:noFill/>
+          </a:ln>
+        </p:spPr>
+        <p:style>
+          <a:lnRef idx="2">
+            <a:schemeClr val="accent1">
+              <a:shade val="50000"/>
+            </a:schemeClr>
+          </a:lnRef>
+          <a:fillRef idx="1">
+            <a:schemeClr val="accent1"/>
+          </a:fillRef>
+          <a:effectRef idx="0">
+            <a:schemeClr val="accent1"/>
+          </a:effectRef>
+          <a:fontRef idx="minor">
+            <a:schemeClr val="lt1"/>
+          </a:fontRef>
+        </p:style>
+        <p:txBody>
+          <a:bodyPr rtlCol="0" anchor="ctr"/>
+          <a:lstStyle/>
+          <a:p>
+            <a:pPr algn="ctr"/>
+            <a:endParaRPr lang="en-CA"/>
+          </a:p>
+        </p:txBody>
+      </p:sp>
+      <p:sp>
+        <p:nvSpPr>
+          <p:cNvPr id="29" name="TextBox 28">
+            <a:extLst>
+              <a:ext uri="{FF2B5EF4-FFF2-40B4-BE49-F238E27FC236}">
+                <a16:creationId xmlns:a16="http://schemas.microsoft.com/office/drawing/2014/main" id="{6933CE07-4ECC-4E78-96AD-9EE85E413747}"/>
+              </a:ext>
+            </a:extLst>
+          </p:cNvPr>
+          <p:cNvSpPr txBox="1"/>
+          <p:nvPr/>
+        </p:nvSpPr>
+        <p:spPr>
+          <a:xfrm>
+            <a:off x="811924" y="2484247"/>
+            <a:ext cx="5499539" cy="400110"/>
+          </a:xfrm>
+          <a:prstGeom prst="rect">
+            <a:avLst/>
+          </a:prstGeom>
+          <a:solidFill>
+            <a:srgbClr val="FFFFFF"/>
+          </a:solidFill>
+        </p:spPr>
+        <p:txBody>
+          <a:bodyPr wrap="square" rtlCol="0">
+            <a:spAutoFit/>
+          </a:bodyPr>
+          <a:lstStyle/>
+          <a:p>
+            <a:r>
+              <a:rPr lang="en-CA" sz="1000" dirty="0">
+                <a:solidFill>
+                  <a:schemeClr val="accent1">
+                    <a:lumMod val="50000"/>
+                  </a:schemeClr>
+                </a:solidFill>
+              </a:rPr>
+              <a:t>Needleleaf	  Broadleaf	    Crops	       Grass 	       Urban/barren/</a:t>
+            </a:r>
+          </a:p>
+          <a:p>
+            <a:r>
+              <a:rPr lang="en-CA" sz="1000" dirty="0">
+                <a:solidFill>
+                  <a:schemeClr val="accent1">
+                    <a:lumMod val="50000"/>
+                  </a:schemeClr>
+                </a:solidFill>
+              </a:rPr>
+              <a:t>				          impervious</a:t>
+            </a:r>
+          </a:p>
+        </p:txBody>
+      </p:sp>
+      <p:grpSp>
+        <p:nvGrpSpPr>
+          <p:cNvPr id="4" name="Group 3">
+            <a:extLst>
+              <a:ext uri="{FF2B5EF4-FFF2-40B4-BE49-F238E27FC236}">
+                <a16:creationId xmlns:a16="http://schemas.microsoft.com/office/drawing/2014/main" id="{FBA1BDFC-F592-420E-9DC8-342C0BF0A6BB}"/>
+              </a:ext>
+            </a:extLst>
+          </p:cNvPr>
+          <p:cNvGrpSpPr/>
+          <p:nvPr/>
+        </p:nvGrpSpPr>
+        <p:grpSpPr>
+          <a:xfrm>
+            <a:off x="814551" y="2412124"/>
+            <a:ext cx="4795816" cy="1759825"/>
+            <a:chOff x="814551" y="2921414"/>
+            <a:chExt cx="4795816" cy="1250535"/>
+          </a:xfrm>
+        </p:grpSpPr>
+        <p:sp>
+          <p:nvSpPr>
+            <p:cNvPr id="17" name="Rectangle 16">
+              <a:extLst>
+                <a:ext uri="{FF2B5EF4-FFF2-40B4-BE49-F238E27FC236}">
+                  <a16:creationId xmlns:a16="http://schemas.microsoft.com/office/drawing/2014/main" id="{3293A71E-A64D-403D-ABFB-464262BB61E9}"/>
+                </a:ext>
+              </a:extLst>
+            </p:cNvPr>
+            <p:cNvSpPr/>
+            <p:nvPr/>
+          </p:nvSpPr>
+          <p:spPr>
+            <a:xfrm>
+              <a:off x="814551" y="2921415"/>
+              <a:ext cx="959069" cy="1250534"/>
+            </a:xfrm>
+            <a:prstGeom prst="rect">
+              <a:avLst/>
+            </a:prstGeom>
+            <a:noFill/>
+          </p:spPr>
+          <p:style>
+            <a:lnRef idx="2">
+              <a:schemeClr val="accent1">
+                <a:shade val="50000"/>
+              </a:schemeClr>
+            </a:lnRef>
+            <a:fillRef idx="1">
+              <a:schemeClr val="accent1"/>
+            </a:fillRef>
+            <a:effectRef idx="0">
+              <a:schemeClr val="accent1"/>
+            </a:effectRef>
+            <a:fontRef idx="minor">
+              <a:schemeClr val="lt1"/>
+            </a:fontRef>
+          </p:style>
+          <p:txBody>
+            <a:bodyPr rtlCol="0" anchor="ctr"/>
+            <a:lstStyle/>
+            <a:p>
+              <a:pPr algn="ctr"/>
+              <a:endParaRPr lang="en-CA"/>
+            </a:p>
+          </p:txBody>
+        </p:sp>
+        <p:sp>
+          <p:nvSpPr>
+            <p:cNvPr id="20" name="Rectangle 19">
+              <a:extLst>
+                <a:ext uri="{FF2B5EF4-FFF2-40B4-BE49-F238E27FC236}">
+                  <a16:creationId xmlns:a16="http://schemas.microsoft.com/office/drawing/2014/main" id="{F63A5048-A92D-43C4-82FF-B985B834CFE0}"/>
+                </a:ext>
+              </a:extLst>
+            </p:cNvPr>
+            <p:cNvSpPr/>
+            <p:nvPr/>
+          </p:nvSpPr>
+          <p:spPr>
+            <a:xfrm>
+              <a:off x="1776247" y="2921414"/>
+              <a:ext cx="959069" cy="1250534"/>
+            </a:xfrm>
+            <a:prstGeom prst="rect">
+              <a:avLst/>
+            </a:prstGeom>
+            <a:noFill/>
+          </p:spPr>
+          <p:style>
+            <a:lnRef idx="2">
+              <a:schemeClr val="accent1">
+                <a:shade val="50000"/>
+              </a:schemeClr>
+            </a:lnRef>
+            <a:fillRef idx="1">
+              <a:schemeClr val="accent1"/>
+            </a:fillRef>
+            <a:effectRef idx="0">
+              <a:schemeClr val="accent1"/>
+            </a:effectRef>
+            <a:fontRef idx="minor">
+              <a:schemeClr val="lt1"/>
+            </a:fontRef>
+          </p:style>
+          <p:txBody>
+            <a:bodyPr rtlCol="0" anchor="ctr"/>
+            <a:lstStyle/>
+            <a:p>
+              <a:pPr algn="ctr"/>
+              <a:endParaRPr lang="en-CA"/>
+            </a:p>
+          </p:txBody>
+        </p:sp>
+        <p:sp>
+          <p:nvSpPr>
+            <p:cNvPr id="21" name="Rectangle 20">
+              <a:extLst>
+                <a:ext uri="{FF2B5EF4-FFF2-40B4-BE49-F238E27FC236}">
+                  <a16:creationId xmlns:a16="http://schemas.microsoft.com/office/drawing/2014/main" id="{E9DDBBFA-FD30-431F-842E-A4791FC6F664}"/>
+                </a:ext>
+              </a:extLst>
+            </p:cNvPr>
+            <p:cNvSpPr/>
+            <p:nvPr/>
+          </p:nvSpPr>
+          <p:spPr>
+            <a:xfrm>
+              <a:off x="2736258" y="2921414"/>
+              <a:ext cx="959069" cy="1250534"/>
+            </a:xfrm>
+            <a:prstGeom prst="rect">
+              <a:avLst/>
+            </a:prstGeom>
+            <a:noFill/>
+          </p:spPr>
+          <p:style>
+            <a:lnRef idx="2">
+              <a:schemeClr val="accent1">
+                <a:shade val="50000"/>
+              </a:schemeClr>
+            </a:lnRef>
+            <a:fillRef idx="1">
+              <a:schemeClr val="accent1"/>
+            </a:fillRef>
+            <a:effectRef idx="0">
+              <a:schemeClr val="accent1"/>
+            </a:effectRef>
+            <a:fontRef idx="minor">
+              <a:schemeClr val="lt1"/>
+            </a:fontRef>
+          </p:style>
+          <p:txBody>
+            <a:bodyPr rtlCol="0" anchor="ctr"/>
+            <a:lstStyle/>
+            <a:p>
+              <a:pPr algn="ctr"/>
+              <a:endParaRPr lang="en-CA"/>
+            </a:p>
+          </p:txBody>
+        </p:sp>
+        <p:sp>
+          <p:nvSpPr>
+            <p:cNvPr id="22" name="Rectangle 21">
+              <a:extLst>
+                <a:ext uri="{FF2B5EF4-FFF2-40B4-BE49-F238E27FC236}">
+                  <a16:creationId xmlns:a16="http://schemas.microsoft.com/office/drawing/2014/main" id="{F48F762A-DC5B-4DB3-9393-D78E6F1441B9}"/>
+                </a:ext>
+              </a:extLst>
+            </p:cNvPr>
+            <p:cNvSpPr/>
+            <p:nvPr/>
+          </p:nvSpPr>
+          <p:spPr>
+            <a:xfrm>
+              <a:off x="3695327" y="2921414"/>
+              <a:ext cx="959069" cy="1250534"/>
+            </a:xfrm>
+            <a:prstGeom prst="rect">
+              <a:avLst/>
+            </a:prstGeom>
+            <a:noFill/>
+          </p:spPr>
+          <p:style>
+            <a:lnRef idx="2">
+              <a:schemeClr val="accent1">
+                <a:shade val="50000"/>
+              </a:schemeClr>
+            </a:lnRef>
+            <a:fillRef idx="1">
+              <a:schemeClr val="accent1"/>
+            </a:fillRef>
+            <a:effectRef idx="0">
+              <a:schemeClr val="accent1"/>
+            </a:effectRef>
+            <a:fontRef idx="minor">
+              <a:schemeClr val="lt1"/>
+            </a:fontRef>
+          </p:style>
+          <p:txBody>
+            <a:bodyPr rtlCol="0" anchor="ctr"/>
+            <a:lstStyle/>
+            <a:p>
+              <a:pPr algn="ctr"/>
+              <a:endParaRPr lang="en-CA"/>
+            </a:p>
+          </p:txBody>
+        </p:sp>
+        <p:sp>
+          <p:nvSpPr>
+            <p:cNvPr id="23" name="Rectangle 22">
+              <a:extLst>
+                <a:ext uri="{FF2B5EF4-FFF2-40B4-BE49-F238E27FC236}">
+                  <a16:creationId xmlns:a16="http://schemas.microsoft.com/office/drawing/2014/main" id="{458C57E0-157B-405D-842A-AFC227B8AE66}"/>
+                </a:ext>
+              </a:extLst>
+            </p:cNvPr>
+            <p:cNvSpPr/>
+            <p:nvPr/>
+          </p:nvSpPr>
+          <p:spPr>
+            <a:xfrm>
+              <a:off x="4651298" y="2921414"/>
+              <a:ext cx="959069" cy="1250534"/>
+            </a:xfrm>
+            <a:prstGeom prst="rect">
+              <a:avLst/>
+            </a:prstGeom>
+            <a:noFill/>
+          </p:spPr>
+          <p:style>
+            <a:lnRef idx="2">
+              <a:schemeClr val="accent1">
+                <a:shade val="50000"/>
+              </a:schemeClr>
+            </a:lnRef>
+            <a:fillRef idx="1">
+              <a:schemeClr val="accent1"/>
+            </a:fillRef>
+            <a:effectRef idx="0">
+              <a:schemeClr val="accent1"/>
+            </a:effectRef>
+            <a:fontRef idx="minor">
+              <a:schemeClr val="lt1"/>
+            </a:fontRef>
+          </p:style>
+          <p:txBody>
+            <a:bodyPr rtlCol="0" anchor="ctr"/>
+            <a:lstStyle/>
+            <a:p>
+              <a:pPr algn="ctr"/>
+              <a:endParaRPr lang="en-CA"/>
+            </a:p>
+          </p:txBody>
+        </p:sp>
+      </p:grpSp>
+      <p:sp>
+        <p:nvSpPr>
+          <p:cNvPr id="30" name="TextBox 29">
+            <a:extLst>
+              <a:ext uri="{FF2B5EF4-FFF2-40B4-BE49-F238E27FC236}">
+                <a16:creationId xmlns:a16="http://schemas.microsoft.com/office/drawing/2014/main" id="{3BA8F264-D974-46DB-A91F-DA4DBE11A6FD}"/>
+              </a:ext>
+            </a:extLst>
+          </p:cNvPr>
+          <p:cNvSpPr txBox="1"/>
+          <p:nvPr/>
+        </p:nvSpPr>
+        <p:spPr>
+          <a:xfrm>
+            <a:off x="5610367" y="2484247"/>
+            <a:ext cx="3762233" cy="400110"/>
+          </a:xfrm>
+          <a:prstGeom prst="rect">
+            <a:avLst/>
+          </a:prstGeom>
+          <a:solidFill>
+            <a:srgbClr val="FFFFFF"/>
+          </a:solidFill>
+        </p:spPr>
+        <p:txBody>
+          <a:bodyPr wrap="square" rtlCol="0">
+            <a:spAutoFit/>
+          </a:bodyPr>
+          <a:lstStyle/>
+          <a:p>
+            <a:r>
+              <a:rPr lang="en-CA" sz="1000" dirty="0">
+                <a:solidFill>
+                  <a:schemeClr val="accent1">
+                    <a:lumMod val="50000"/>
+                  </a:schemeClr>
+                </a:solidFill>
+              </a:rPr>
+              <a:t>       Needleleaf	             Broadleaf	               Crops	            Grass 	</a:t>
+            </a:r>
+          </a:p>
+        </p:txBody>
+      </p:sp>
+      <p:grpSp>
+        <p:nvGrpSpPr>
+          <p:cNvPr id="31" name="Group 30">
+            <a:extLst>
+              <a:ext uri="{FF2B5EF4-FFF2-40B4-BE49-F238E27FC236}">
+                <a16:creationId xmlns:a16="http://schemas.microsoft.com/office/drawing/2014/main" id="{EC7D8457-7C1A-4631-9848-E807B8FB9D40}"/>
+              </a:ext>
+            </a:extLst>
+          </p:cNvPr>
+          <p:cNvGrpSpPr/>
+          <p:nvPr/>
+        </p:nvGrpSpPr>
+        <p:grpSpPr>
+          <a:xfrm>
+            <a:off x="5612994" y="2412124"/>
+            <a:ext cx="3767676" cy="1759825"/>
+            <a:chOff x="814551" y="2921414"/>
+            <a:chExt cx="3767676" cy="1250535"/>
+          </a:xfrm>
+        </p:grpSpPr>
+        <p:sp>
+          <p:nvSpPr>
+            <p:cNvPr id="32" name="Rectangle 31">
+              <a:extLst>
+                <a:ext uri="{FF2B5EF4-FFF2-40B4-BE49-F238E27FC236}">
+                  <a16:creationId xmlns:a16="http://schemas.microsoft.com/office/drawing/2014/main" id="{A759CEA6-B18F-4C01-9B4C-398A72315D69}"/>
+                </a:ext>
+              </a:extLst>
+            </p:cNvPr>
+            <p:cNvSpPr/>
+            <p:nvPr/>
+          </p:nvSpPr>
+          <p:spPr>
+            <a:xfrm>
+              <a:off x="814551" y="2921415"/>
+              <a:ext cx="1189827" cy="1250534"/>
+            </a:xfrm>
+            <a:prstGeom prst="rect">
+              <a:avLst/>
+            </a:prstGeom>
+            <a:noFill/>
+          </p:spPr>
+          <p:style>
+            <a:lnRef idx="2">
+              <a:schemeClr val="accent1">
+                <a:shade val="50000"/>
+              </a:schemeClr>
+            </a:lnRef>
+            <a:fillRef idx="1">
+              <a:schemeClr val="accent1"/>
+            </a:fillRef>
+            <a:effectRef idx="0">
+              <a:schemeClr val="accent1"/>
+            </a:effectRef>
+            <a:fontRef idx="minor">
+              <a:schemeClr val="lt1"/>
+            </a:fontRef>
+          </p:style>
+          <p:txBody>
+            <a:bodyPr rtlCol="0" anchor="ctr"/>
+            <a:lstStyle/>
+            <a:p>
+              <a:pPr algn="ctr"/>
+              <a:endParaRPr lang="en-CA"/>
+            </a:p>
+          </p:txBody>
+        </p:sp>
+        <p:sp>
+          <p:nvSpPr>
+            <p:cNvPr id="33" name="Rectangle 32">
+              <a:extLst>
+                <a:ext uri="{FF2B5EF4-FFF2-40B4-BE49-F238E27FC236}">
+                  <a16:creationId xmlns:a16="http://schemas.microsoft.com/office/drawing/2014/main" id="{BD9D0EF4-55D7-4CB9-AF79-F856D2CD0D8E}"/>
+                </a:ext>
+              </a:extLst>
+            </p:cNvPr>
+            <p:cNvSpPr/>
+            <p:nvPr/>
+          </p:nvSpPr>
+          <p:spPr>
+            <a:xfrm>
+              <a:off x="2004378" y="2921414"/>
+              <a:ext cx="959069" cy="1250534"/>
+            </a:xfrm>
+            <a:prstGeom prst="rect">
+              <a:avLst/>
+            </a:prstGeom>
+            <a:noFill/>
+          </p:spPr>
+          <p:style>
+            <a:lnRef idx="2">
+              <a:schemeClr val="accent1">
+                <a:shade val="50000"/>
+              </a:schemeClr>
+            </a:lnRef>
+            <a:fillRef idx="1">
+              <a:schemeClr val="accent1"/>
+            </a:fillRef>
+            <a:effectRef idx="0">
+              <a:schemeClr val="accent1"/>
+            </a:effectRef>
+            <a:fontRef idx="minor">
+              <a:schemeClr val="lt1"/>
+            </a:fontRef>
+          </p:style>
+          <p:txBody>
+            <a:bodyPr rtlCol="0" anchor="ctr"/>
+            <a:lstStyle/>
+            <a:p>
+              <a:pPr algn="ctr"/>
+              <a:endParaRPr lang="en-CA"/>
+            </a:p>
+          </p:txBody>
+        </p:sp>
+        <p:sp>
+          <p:nvSpPr>
+            <p:cNvPr id="34" name="Rectangle 33">
+              <a:extLst>
+                <a:ext uri="{FF2B5EF4-FFF2-40B4-BE49-F238E27FC236}">
+                  <a16:creationId xmlns:a16="http://schemas.microsoft.com/office/drawing/2014/main" id="{2D3EA1F9-6701-4323-B577-65E0AB3439DA}"/>
+                </a:ext>
+              </a:extLst>
+            </p:cNvPr>
+            <p:cNvSpPr/>
+            <p:nvPr/>
+          </p:nvSpPr>
+          <p:spPr>
+            <a:xfrm>
+              <a:off x="2960350" y="2921414"/>
+              <a:ext cx="890844" cy="1250534"/>
+            </a:xfrm>
+            <a:prstGeom prst="rect">
+              <a:avLst/>
+            </a:prstGeom>
+            <a:noFill/>
+          </p:spPr>
+          <p:style>
+            <a:lnRef idx="2">
+              <a:schemeClr val="accent1">
+                <a:shade val="50000"/>
+              </a:schemeClr>
+            </a:lnRef>
+            <a:fillRef idx="1">
+              <a:schemeClr val="accent1"/>
+            </a:fillRef>
+            <a:effectRef idx="0">
+              <a:schemeClr val="accent1"/>
+            </a:effectRef>
+            <a:fontRef idx="minor">
+              <a:schemeClr val="lt1"/>
+            </a:fontRef>
+          </p:style>
+          <p:txBody>
+            <a:bodyPr rtlCol="0" anchor="ctr"/>
+            <a:lstStyle/>
+            <a:p>
+              <a:pPr algn="ctr"/>
+              <a:endParaRPr lang="en-CA"/>
+            </a:p>
+          </p:txBody>
+        </p:sp>
+        <p:sp>
+          <p:nvSpPr>
+            <p:cNvPr id="35" name="Rectangle 34">
+              <a:extLst>
+                <a:ext uri="{FF2B5EF4-FFF2-40B4-BE49-F238E27FC236}">
+                  <a16:creationId xmlns:a16="http://schemas.microsoft.com/office/drawing/2014/main" id="{E298F446-43CA-48F9-A9D7-A488A6C35B04}"/>
+                </a:ext>
+              </a:extLst>
+            </p:cNvPr>
+            <p:cNvSpPr/>
+            <p:nvPr/>
+          </p:nvSpPr>
+          <p:spPr>
+            <a:xfrm>
+              <a:off x="3852512" y="2921414"/>
+              <a:ext cx="729715" cy="1250534"/>
+            </a:xfrm>
+            <a:prstGeom prst="rect">
+              <a:avLst/>
+            </a:prstGeom>
+            <a:noFill/>
+          </p:spPr>
+          <p:style>
+            <a:lnRef idx="2">
+              <a:schemeClr val="accent1">
+                <a:shade val="50000"/>
+              </a:schemeClr>
+            </a:lnRef>
+            <a:fillRef idx="1">
+              <a:schemeClr val="accent1"/>
+            </a:fillRef>
+            <a:effectRef idx="0">
+              <a:schemeClr val="accent1"/>
+            </a:effectRef>
+            <a:fontRef idx="minor">
+              <a:schemeClr val="lt1"/>
+            </a:fontRef>
+          </p:style>
+          <p:txBody>
+            <a:bodyPr rtlCol="0" anchor="ctr"/>
+            <a:lstStyle/>
+            <a:p>
+              <a:pPr algn="ctr"/>
+              <a:endParaRPr lang="en-CA"/>
+            </a:p>
+          </p:txBody>
+        </p:sp>
+      </p:grpSp>
+    </p:spTree>
+    <p:extLst>
+      <p:ext uri="{BB962C8B-B14F-4D97-AF65-F5344CB8AC3E}">
+        <p14:creationId xmlns:p14="http://schemas.microsoft.com/office/powerpoint/2010/main" val="2347818202"/>
+      </p:ext>
+    </p:extLst>
+  </p:cSld>
+  <p:clrMapOvr>
+    <a:masterClrMapping/>
+  </p:clrMapOvr>
+</p:sld>
+</file>
+
+<file path=ppt/slides/slide11.xml><?xml version="1.0" encoding="utf-8"?>
 <p:sld xmlns:a="http://schemas.openxmlformats.org/drawingml/2006/main" xmlns:r="http://schemas.openxmlformats.org/officeDocument/2006/relationships" xmlns:p="http://schemas.openxmlformats.org/presentationml/2006/main">
   <p:cSld>
     <p:spTree>
@@ -3527,7 +4889,7 @@
 </p:sld>
 </file>
 
-<file path=ppt/slides/slide11.xml><?xml version="1.0" encoding="utf-8"?>
+<file path=ppt/slides/slide12.xml><?xml version="1.0" encoding="utf-8"?>
 <p:sld xmlns:a="http://schemas.openxmlformats.org/drawingml/2006/main" xmlns:r="http://schemas.openxmlformats.org/officeDocument/2006/relationships" xmlns:p="http://schemas.openxmlformats.org/presentationml/2006/main">
   <p:cSld>
     <p:spTree>
@@ -3888,7 +5250,7 @@
 </p:sld>
 </file>
 
-<file path=ppt/slides/slide12.xml><?xml version="1.0" encoding="utf-8"?>
+<file path=ppt/slides/slide13.xml><?xml version="1.0" encoding="utf-8"?>
 <p:sld xmlns:a="http://schemas.openxmlformats.org/drawingml/2006/main" xmlns:r="http://schemas.openxmlformats.org/officeDocument/2006/relationships" xmlns:p="http://schemas.openxmlformats.org/presentationml/2006/main">
   <p:cSld>
     <p:spTree>
@@ -4084,7 +5446,7 @@
 </p:sld>
 </file>
 
-<file path=ppt/slides/slide13.xml><?xml version="1.0" encoding="utf-8"?>
+<file path=ppt/slides/slide14.xml><?xml version="1.0" encoding="utf-8"?>
 <p:sld xmlns:a="http://schemas.openxmlformats.org/drawingml/2006/main" xmlns:r="http://schemas.openxmlformats.org/officeDocument/2006/relationships" xmlns:p="http://schemas.openxmlformats.org/presentationml/2006/main">
   <p:cSld>
     <p:spTree>
@@ -4185,11 +5547,7 @@
             <a:pPr lvl="1"/>
             <a:r>
               <a:rPr lang="en-US" dirty="0" smtClean="0"/>
-              <a:t>Try the search bar in addition to the page tree </a:t>
-            </a:r>
-            <a:r>
-              <a:rPr lang="en-US" dirty="0" smtClean="0"/>
-              <a:t>navigation</a:t>
+              <a:t>Try the search bar in addition to the page tree navigation</a:t>
             </a:r>
           </a:p>
           <a:p>
@@ -4364,8 +5722,22 @@
           <a:p>
             <a:r>
               <a:rPr lang="en-US" dirty="0" smtClean="0"/>
-              <a:t>Familiarize yourself with the site</a:t>
-            </a:r>
+              <a:t>Familiarize yourself with the </a:t>
+            </a:r>
+            <a:r>
+              <a:rPr lang="en-US" dirty="0" smtClean="0"/>
+              <a:t>site</a:t>
+            </a:r>
+          </a:p>
+          <a:p>
+            <a:pPr lvl="1"/>
+            <a:r>
+              <a:rPr lang="en-CA" dirty="0">
+                <a:hlinkClick r:id="rId4"/>
+              </a:rPr>
+              <a:t>http://ccrnetwork.ca/science/WECC/boreal-forest/berms.php</a:t>
+            </a:r>
+            <a:endParaRPr lang="en-US" dirty="0" smtClean="0"/>
           </a:p>
           <a:p>
             <a:r>
@@ -4666,7 +6038,11 @@
           <a:p>
             <a:r>
               <a:rPr lang="en-US" dirty="0" smtClean="0"/>
-              <a:t>Meteorological forcing data files</a:t>
+              <a:t>Prepare meteorological </a:t>
+            </a:r>
+            <a:r>
+              <a:rPr lang="en-US" dirty="0" smtClean="0"/>
+              <a:t>forcing data files</a:t>
             </a:r>
           </a:p>
           <a:p>
@@ -4677,7 +6053,7 @@
             </a:r>
             <a:r>
               <a:rPr lang="en-CA" sz="1800" u="sng" dirty="0">
-                <a:hlinkClick r:id="rId2"/>
+                <a:hlinkClick r:id="rId3"/>
               </a:rPr>
               <a:t>https://wiki.usask.ca/display/MESH/Meteorological+Input</a:t>
             </a:r>
@@ -4717,15 +6093,7 @@
             <a:pPr lvl="2"/>
             <a:r>
               <a:rPr lang="en-US" dirty="0" smtClean="0"/>
-              <a:t>Note: </a:t>
-            </a:r>
-            <a:r>
-              <a:rPr lang="en-US" dirty="0" smtClean="0"/>
-              <a:t>I manually </a:t>
-            </a:r>
-            <a:r>
-              <a:rPr lang="en-US" dirty="0" smtClean="0"/>
-              <a:t>downloaded the observed data from WISKI desktop app as WISKI Tools python code was not working for BER_OBS_11 (Modelling dataset)</a:t>
+              <a:t>Note: I manually downloaded the observed data from WISKI desktop app as WISKI Tools python code was not working for BER_OBS_11 (Modelling dataset)</a:t>
             </a:r>
             <a:endParaRPr lang="en-CA" dirty="0"/>
           </a:p>
@@ -4796,7 +6164,9 @@
         </p:nvSpPr>
         <p:spPr/>
         <p:txBody>
-          <a:bodyPr/>
+          <a:bodyPr>
+            <a:normAutofit lnSpcReduction="10000"/>
+          </a:bodyPr>
           <a:lstStyle/>
           <a:p>
             <a:r>
@@ -4839,8 +6209,40 @@
             <a:pPr lvl="1"/>
             <a:r>
               <a:rPr lang="en-US" dirty="0" smtClean="0"/>
-              <a:t>Additional parameters need to be defined if using PDMROF or FROZEN algorithms</a:t>
-            </a:r>
+              <a:t>Additional parameters need to be defined if </a:t>
+            </a:r>
+            <a:r>
+              <a:rPr lang="en-US" dirty="0" smtClean="0"/>
+              <a:t>using PDMROF </a:t>
+            </a:r>
+            <a:r>
+              <a:rPr lang="en-US" dirty="0" smtClean="0"/>
+              <a:t>or FROZEN </a:t>
+            </a:r>
+            <a:r>
+              <a:rPr lang="en-US" dirty="0" smtClean="0"/>
+              <a:t>algorithms</a:t>
+            </a:r>
+          </a:p>
+          <a:p>
+            <a:pPr lvl="2"/>
+            <a:r>
+              <a:rPr lang="en-US" dirty="0" smtClean="0"/>
+              <a:t>Note: for </a:t>
+            </a:r>
+            <a:r>
+              <a:rPr lang="en-US" dirty="0"/>
+              <a:t>using FROZENSOILINFILFLAG: number of columns for </a:t>
+            </a:r>
+            <a:r>
+              <a:rPr lang="en-US" dirty="0" err="1"/>
+              <a:t>to_ACC</a:t>
+            </a:r>
+            <a:r>
+              <a:rPr lang="en-US" dirty="0"/>
+              <a:t> must = number of year running the model </a:t>
+            </a:r>
+            <a:endParaRPr lang="en-US" dirty="0" smtClean="0"/>
           </a:p>
           <a:p>
             <a:pPr lvl="1"/>
@@ -4849,12 +6251,12 @@
               <a:t>Some of </a:t>
             </a:r>
             <a:r>
-              <a:rPr lang="en-US" dirty="0" err="1" smtClean="0"/>
-              <a:t>thehydrology</a:t>
-            </a:r>
-            <a:r>
               <a:rPr lang="en-US" dirty="0" smtClean="0"/>
-              <a:t> parameters in the CLASS file not used for flat CLASS</a:t>
+              <a:t>the hydrology </a:t>
+            </a:r>
+            <a:r>
+              <a:rPr lang="en-US" dirty="0" smtClean="0"/>
+              <a:t>parameters in the CLASS file not used for flat CLASS</a:t>
             </a:r>
             <a:endParaRPr lang="en-CA" dirty="0" smtClean="0"/>
           </a:p>
@@ -4862,7 +6264,15 @@
             <a:pPr lvl="1"/>
             <a:r>
               <a:rPr lang="en-US" dirty="0" smtClean="0"/>
-              <a:t>Note the different sections of the CLASS.ini file (see next slide if needed)</a:t>
+              <a:t>Note the different sections of the CLASS.ini file (see </a:t>
+            </a:r>
+            <a:r>
+              <a:rPr lang="en-US" dirty="0" smtClean="0"/>
+              <a:t>future slides </a:t>
+            </a:r>
+            <a:r>
+              <a:rPr lang="en-US" dirty="0" smtClean="0"/>
+              <a:t>if needed)</a:t>
             </a:r>
           </a:p>
           <a:p>
@@ -5034,20 +6444,28 @@
             </a:r>
             <a:r>
               <a:rPr lang="en-US" dirty="0" smtClean="0"/>
-              <a:t> of the forcing data (specified in CLASS.ini)</a:t>
+              <a:t> of the forcing data </a:t>
+            </a:r>
+            <a:r>
+              <a:rPr lang="en-US" dirty="0" smtClean="0"/>
+              <a:t>(which is specified </a:t>
+            </a:r>
+            <a:r>
+              <a:rPr lang="en-US" dirty="0" smtClean="0"/>
+              <a:t>in CLASS.ini)</a:t>
             </a:r>
           </a:p>
           <a:p>
             <a:pPr lvl="1"/>
             <a:r>
               <a:rPr lang="en-CA" dirty="0">
-                <a:hlinkClick r:id="rId2"/>
+                <a:hlinkClick r:id="rId3"/>
               </a:rPr>
               <a:t>https://</a:t>
             </a:r>
             <a:r>
               <a:rPr lang="en-CA" dirty="0" smtClean="0">
-                <a:hlinkClick r:id="rId2"/>
+                <a:hlinkClick r:id="rId3"/>
               </a:rPr>
               <a:t>wiki.usask.ca/display/MESH/MESH_input_run_options.ini</a:t>
             </a:r>
@@ -5133,8 +6551,13 @@
           <a:p>
             <a:r>
               <a:rPr lang="en-US" dirty="0" smtClean="0"/>
-              <a:t>Set up run scripts</a:t>
-            </a:r>
+              <a:t>Set up run </a:t>
+            </a:r>
+            <a:r>
+              <a:rPr lang="en-US" dirty="0" smtClean="0"/>
+              <a:t>scripts and run the model</a:t>
+            </a:r>
+            <a:endParaRPr lang="en-US" dirty="0" smtClean="0"/>
           </a:p>
           <a:p>
             <a:pPr lvl="1"/>
@@ -5162,8 +6585,17 @@
             <a:pPr lvl="2"/>
             <a:r>
               <a:rPr lang="en-US" dirty="0" smtClean="0"/>
-              <a:t>Puts a symbolic link to the driving data in the folder</a:t>
-            </a:r>
+              <a:t>Creates </a:t>
+            </a:r>
+            <a:r>
+              <a:rPr lang="en-US" dirty="0" smtClean="0"/>
+              <a:t>a symbolic link to the driving data in the </a:t>
+            </a:r>
+            <a:r>
+              <a:rPr lang="en-US" dirty="0" smtClean="0"/>
+              <a:t>model folder</a:t>
+            </a:r>
+            <a:endParaRPr lang="en-US" dirty="0" smtClean="0"/>
           </a:p>
           <a:p>
             <a:pPr lvl="2"/>
@@ -5176,7 +6608,11 @@
             <a:pPr lvl="2"/>
             <a:r>
               <a:rPr lang="en-US" dirty="0" smtClean="0"/>
-              <a:t>Run the model</a:t>
+              <a:t>Runs </a:t>
+            </a:r>
+            <a:r>
+              <a:rPr lang="en-US" dirty="0" smtClean="0"/>
+              <a:t>the model</a:t>
             </a:r>
           </a:p>
           <a:p>
@@ -5192,7 +6628,46 @@
                   </a:glow>
                 </a:effectLst>
               </a:rPr>
-              <a:t>Process the outputs and generate image files of the graphs</a:t>
+              <a:t>Process the outputs and generate image files of the </a:t>
+            </a:r>
+            <a:r>
+              <a:rPr lang="en-US" dirty="0" smtClean="0">
+                <a:effectLst>
+                  <a:glow rad="228600">
+                    <a:schemeClr val="accent4">
+                      <a:satMod val="175000"/>
+                      <a:alpha val="40000"/>
+                    </a:schemeClr>
+                  </a:glow>
+                </a:effectLst>
+              </a:rPr>
+              <a:t>graphs (not working -&gt; issue with windows </a:t>
+            </a:r>
+            <a:r>
+              <a:rPr lang="en-US" dirty="0" err="1" smtClean="0">
+                <a:effectLst>
+                  <a:glow rad="228600">
+                    <a:schemeClr val="accent4">
+                      <a:satMod val="175000"/>
+                      <a:alpha val="40000"/>
+                    </a:schemeClr>
+                  </a:glow>
+                </a:effectLst>
+              </a:rPr>
+              <a:t>linux</a:t>
+            </a:r>
+            <a:r>
+              <a:rPr lang="en-US" smtClean="0">
+                <a:effectLst>
+                  <a:glow rad="228600">
+                    <a:schemeClr val="accent4">
+                      <a:satMod val="175000"/>
+                      <a:alpha val="40000"/>
+                    </a:schemeClr>
+                  </a:glow>
+                </a:effectLst>
+              </a:rPr>
+              <a:t> subsystem)</a:t>
             </a:r>
             <a:endParaRPr lang="en-CA" dirty="0" smtClean="0">
               <a:effectLst>
@@ -5204,14 +6679,6 @@
                 </a:glow>
               </a:effectLst>
             </a:endParaRPr>
-          </a:p>
-          <a:p>
-            <a:r>
-              <a:rPr lang="en-US" dirty="0" smtClean="0">
-                <a:effectLst/>
-              </a:rPr>
-              <a:t>Run the model</a:t>
-            </a:r>
           </a:p>
         </p:txBody>
       </p:sp>
@@ -5229,6 +6696,100 @@
 </file>
 
 <file path=ppt/slides/slide8.xml><?xml version="1.0" encoding="utf-8"?>
+<p:sld xmlns:a="http://schemas.openxmlformats.org/drawingml/2006/main" xmlns:r="http://schemas.openxmlformats.org/officeDocument/2006/relationships" xmlns:p="http://schemas.openxmlformats.org/presentationml/2006/main">
+  <p:cSld>
+    <p:spTree>
+      <p:nvGrpSpPr>
+        <p:cNvPr id="1" name=""/>
+        <p:cNvGrpSpPr/>
+        <p:nvPr/>
+      </p:nvGrpSpPr>
+      <p:grpSpPr>
+        <a:xfrm>
+          <a:off x="0" y="0"/>
+          <a:ext cx="0" cy="0"/>
+          <a:chOff x="0" y="0"/>
+          <a:chExt cx="0" cy="0"/>
+        </a:xfrm>
+      </p:grpSpPr>
+      <p:sp>
+        <p:nvSpPr>
+          <p:cNvPr id="2" name="Title 1"/>
+          <p:cNvSpPr>
+            <a:spLocks noGrp="1"/>
+          </p:cNvSpPr>
+          <p:nvPr>
+            <p:ph type="title"/>
+          </p:nvPr>
+        </p:nvSpPr>
+        <p:spPr/>
+        <p:txBody>
+          <a:bodyPr/>
+          <a:lstStyle/>
+          <a:p>
+            <a:r>
+              <a:rPr lang="en-US" dirty="0" smtClean="0"/>
+              <a:t>Process the Model Outputs</a:t>
+            </a:r>
+            <a:endParaRPr lang="en-CA" dirty="0"/>
+          </a:p>
+        </p:txBody>
+      </p:sp>
+      <p:sp>
+        <p:nvSpPr>
+          <p:cNvPr id="3" name="Content Placeholder 2"/>
+          <p:cNvSpPr>
+            <a:spLocks noGrp="1"/>
+          </p:cNvSpPr>
+          <p:nvPr>
+            <p:ph idx="1"/>
+          </p:nvPr>
+        </p:nvSpPr>
+        <p:spPr/>
+        <p:txBody>
+          <a:bodyPr/>
+          <a:lstStyle/>
+          <a:p>
+            <a:r>
+              <a:rPr lang="en-US" dirty="0"/>
+              <a:t>Open the </a:t>
+            </a:r>
+            <a:r>
+              <a:rPr lang="en-US" dirty="0" err="1"/>
+              <a:t>ipynb</a:t>
+            </a:r>
+            <a:r>
+              <a:rPr lang="en-US" dirty="0"/>
+              <a:t> in the output folder and run all -&gt; this will save the plots as .</a:t>
+            </a:r>
+            <a:r>
+              <a:rPr lang="en-US" dirty="0" err="1"/>
+              <a:t>png</a:t>
+            </a:r>
+            <a:r>
+              <a:rPr lang="en-US" dirty="0"/>
+              <a:t> files for comparison with other scenarios</a:t>
+            </a:r>
+          </a:p>
+          <a:p>
+            <a:endParaRPr lang="en-CA" dirty="0"/>
+          </a:p>
+        </p:txBody>
+      </p:sp>
+    </p:spTree>
+    <p:extLst>
+      <p:ext uri="{BB962C8B-B14F-4D97-AF65-F5344CB8AC3E}">
+        <p14:creationId xmlns:p14="http://schemas.microsoft.com/office/powerpoint/2010/main" val="712750625"/>
+      </p:ext>
+    </p:extLst>
+  </p:cSld>
+  <p:clrMapOvr>
+    <a:masterClrMapping/>
+  </p:clrMapOvr>
+</p:sld>
+</file>
+
+<file path=ppt/slides/slide9.xml><?xml version="1.0" encoding="utf-8"?>
 <p:sld xmlns:a="http://schemas.openxmlformats.org/drawingml/2006/main" xmlns:r="http://schemas.openxmlformats.org/officeDocument/2006/relationships" xmlns:p="http://schemas.openxmlformats.org/presentationml/2006/main">
   <p:cSld>
     <p:spTree>
@@ -5772,800 +7333,6 @@
 </p:sld>
 </file>
 
-<file path=ppt/slides/slide9.xml><?xml version="1.0" encoding="utf-8"?>
-<p:sld xmlns:a="http://schemas.openxmlformats.org/drawingml/2006/main" xmlns:r="http://schemas.openxmlformats.org/officeDocument/2006/relationships" xmlns:p="http://schemas.openxmlformats.org/presentationml/2006/main">
-  <p:cSld>
-    <p:spTree>
-      <p:nvGrpSpPr>
-        <p:cNvPr id="1" name=""/>
-        <p:cNvGrpSpPr/>
-        <p:nvPr/>
-      </p:nvGrpSpPr>
-      <p:grpSpPr>
-        <a:xfrm>
-          <a:off x="0" y="0"/>
-          <a:ext cx="0" cy="0"/>
-          <a:chOff x="0" y="0"/>
-          <a:chExt cx="0" cy="0"/>
-        </a:xfrm>
-      </p:grpSpPr>
-      <p:pic>
-        <p:nvPicPr>
-          <p:cNvPr id="37" name="Picture 36">
-            <a:extLst>
-              <a:ext uri="{FF2B5EF4-FFF2-40B4-BE49-F238E27FC236}">
-                <a16:creationId xmlns:a16="http://schemas.microsoft.com/office/drawing/2014/main" id="{7D20F396-FC57-4471-B5B7-30BF98E86416}"/>
-              </a:ext>
-            </a:extLst>
-          </p:cNvPr>
-          <p:cNvPicPr>
-            <a:picLocks noChangeAspect="1"/>
-          </p:cNvPicPr>
-          <p:nvPr/>
-        </p:nvPicPr>
-        <p:blipFill>
-          <a:blip r:embed="rId2"/>
-          <a:stretch>
-            <a:fillRect/>
-          </a:stretch>
-        </p:blipFill>
-        <p:spPr>
-          <a:xfrm>
-            <a:off x="805168" y="2183746"/>
-            <a:ext cx="11370694" cy="3476926"/>
-          </a:xfrm>
-          <a:prstGeom prst="rect">
-            <a:avLst/>
-          </a:prstGeom>
-        </p:spPr>
-      </p:pic>
-      <p:sp>
-        <p:nvSpPr>
-          <p:cNvPr id="2" name="Title 1">
-            <a:extLst>
-              <a:ext uri="{FF2B5EF4-FFF2-40B4-BE49-F238E27FC236}">
-                <a16:creationId xmlns:a16="http://schemas.microsoft.com/office/drawing/2014/main" id="{98442713-896C-47B4-B7D0-7650989B73B1}"/>
-              </a:ext>
-            </a:extLst>
-          </p:cNvPr>
-          <p:cNvSpPr>
-            <a:spLocks noGrp="1"/>
-          </p:cNvSpPr>
-          <p:nvPr>
-            <p:ph type="title"/>
-          </p:nvPr>
-        </p:nvSpPr>
-        <p:spPr/>
-        <p:txBody>
-          <a:bodyPr/>
-          <a:lstStyle/>
-          <a:p>
-            <a:r>
-              <a:rPr lang="en-CA" dirty="0"/>
-              <a:t>MESH Model Files – CLASS.ini</a:t>
-            </a:r>
-          </a:p>
-        </p:txBody>
-      </p:sp>
-      <p:sp>
-        <p:nvSpPr>
-          <p:cNvPr id="16" name="TextBox 15">
-            <a:extLst>
-              <a:ext uri="{FF2B5EF4-FFF2-40B4-BE49-F238E27FC236}">
-                <a16:creationId xmlns:a16="http://schemas.microsoft.com/office/drawing/2014/main" id="{A52799F9-C401-41B8-9DA4-9D892FEAD414}"/>
-              </a:ext>
-            </a:extLst>
-          </p:cNvPr>
-          <p:cNvSpPr txBox="1"/>
-          <p:nvPr/>
-        </p:nvSpPr>
-        <p:spPr>
-          <a:xfrm>
-            <a:off x="-1" y="3150630"/>
-            <a:ext cx="797099" cy="400110"/>
-          </a:xfrm>
-          <a:prstGeom prst="rect">
-            <a:avLst/>
-          </a:prstGeom>
-          <a:noFill/>
-        </p:spPr>
-        <p:txBody>
-          <a:bodyPr wrap="square" rtlCol="0">
-            <a:spAutoFit/>
-          </a:bodyPr>
-          <a:lstStyle/>
-          <a:p>
-            <a:r>
-              <a:rPr lang="en-CA" sz="1000" dirty="0"/>
-              <a:t>Vegetation Parameters</a:t>
-            </a:r>
-          </a:p>
-        </p:txBody>
-      </p:sp>
-      <p:sp>
-        <p:nvSpPr>
-          <p:cNvPr id="3" name="Rectangle 2">
-            <a:extLst>
-              <a:ext uri="{FF2B5EF4-FFF2-40B4-BE49-F238E27FC236}">
-                <a16:creationId xmlns:a16="http://schemas.microsoft.com/office/drawing/2014/main" id="{E6C651E3-BB74-4519-8DD7-1A1559793A88}"/>
-              </a:ext>
-            </a:extLst>
-          </p:cNvPr>
-          <p:cNvSpPr/>
-          <p:nvPr/>
-        </p:nvSpPr>
-        <p:spPr>
-          <a:xfrm>
-            <a:off x="733097" y="2191017"/>
-            <a:ext cx="11441447" cy="678308"/>
-          </a:xfrm>
-          <a:prstGeom prst="rect">
-            <a:avLst/>
-          </a:prstGeom>
-          <a:solidFill>
-            <a:srgbClr val="FFFFFF">
-              <a:alpha val="69804"/>
-            </a:srgbClr>
-          </a:solidFill>
-          <a:ln>
-            <a:noFill/>
-          </a:ln>
-        </p:spPr>
-        <p:style>
-          <a:lnRef idx="2">
-            <a:schemeClr val="accent1">
-              <a:shade val="50000"/>
-            </a:schemeClr>
-          </a:lnRef>
-          <a:fillRef idx="1">
-            <a:schemeClr val="accent1"/>
-          </a:fillRef>
-          <a:effectRef idx="0">
-            <a:schemeClr val="accent1"/>
-          </a:effectRef>
-          <a:fontRef idx="minor">
-            <a:schemeClr val="lt1"/>
-          </a:fontRef>
-        </p:style>
-        <p:txBody>
-          <a:bodyPr rtlCol="0" anchor="ctr"/>
-          <a:lstStyle/>
-          <a:p>
-            <a:pPr algn="ctr"/>
-            <a:endParaRPr lang="en-CA"/>
-          </a:p>
-        </p:txBody>
-      </p:sp>
-      <p:sp>
-        <p:nvSpPr>
-          <p:cNvPr id="24" name="Rectangle 23">
-            <a:extLst>
-              <a:ext uri="{FF2B5EF4-FFF2-40B4-BE49-F238E27FC236}">
-                <a16:creationId xmlns:a16="http://schemas.microsoft.com/office/drawing/2014/main" id="{BC216150-2CD4-4162-B211-4F36A495A37F}"/>
-              </a:ext>
-            </a:extLst>
-          </p:cNvPr>
-          <p:cNvSpPr/>
-          <p:nvPr/>
-        </p:nvSpPr>
-        <p:spPr>
-          <a:xfrm>
-            <a:off x="685800" y="4202011"/>
-            <a:ext cx="11441447" cy="1494927"/>
-          </a:xfrm>
-          <a:prstGeom prst="rect">
-            <a:avLst/>
-          </a:prstGeom>
-          <a:solidFill>
-            <a:srgbClr val="FFFFFF">
-              <a:alpha val="69804"/>
-            </a:srgbClr>
-          </a:solidFill>
-          <a:ln>
-            <a:noFill/>
-          </a:ln>
-        </p:spPr>
-        <p:style>
-          <a:lnRef idx="2">
-            <a:schemeClr val="accent1">
-              <a:shade val="50000"/>
-            </a:schemeClr>
-          </a:lnRef>
-          <a:fillRef idx="1">
-            <a:schemeClr val="accent1"/>
-          </a:fillRef>
-          <a:effectRef idx="0">
-            <a:schemeClr val="accent1"/>
-          </a:effectRef>
-          <a:fontRef idx="minor">
-            <a:schemeClr val="lt1"/>
-          </a:fontRef>
-        </p:style>
-        <p:txBody>
-          <a:bodyPr rtlCol="0" anchor="ctr"/>
-          <a:lstStyle/>
-          <a:p>
-            <a:pPr algn="ctr"/>
-            <a:endParaRPr lang="en-CA"/>
-          </a:p>
-        </p:txBody>
-      </p:sp>
-      <p:sp>
-        <p:nvSpPr>
-          <p:cNvPr id="29" name="TextBox 28">
-            <a:extLst>
-              <a:ext uri="{FF2B5EF4-FFF2-40B4-BE49-F238E27FC236}">
-                <a16:creationId xmlns:a16="http://schemas.microsoft.com/office/drawing/2014/main" id="{6933CE07-4ECC-4E78-96AD-9EE85E413747}"/>
-              </a:ext>
-            </a:extLst>
-          </p:cNvPr>
-          <p:cNvSpPr txBox="1"/>
-          <p:nvPr/>
-        </p:nvSpPr>
-        <p:spPr>
-          <a:xfrm>
-            <a:off x="811924" y="2484247"/>
-            <a:ext cx="5499539" cy="400110"/>
-          </a:xfrm>
-          <a:prstGeom prst="rect">
-            <a:avLst/>
-          </a:prstGeom>
-          <a:solidFill>
-            <a:srgbClr val="FFFFFF"/>
-          </a:solidFill>
-        </p:spPr>
-        <p:txBody>
-          <a:bodyPr wrap="square" rtlCol="0">
-            <a:spAutoFit/>
-          </a:bodyPr>
-          <a:lstStyle/>
-          <a:p>
-            <a:r>
-              <a:rPr lang="en-CA" sz="1000" dirty="0">
-                <a:solidFill>
-                  <a:schemeClr val="accent1">
-                    <a:lumMod val="50000"/>
-                  </a:schemeClr>
-                </a:solidFill>
-              </a:rPr>
-              <a:t>Needleleaf	  Broadleaf	    Crops	       Grass 	       Urban/barren/</a:t>
-            </a:r>
-          </a:p>
-          <a:p>
-            <a:r>
-              <a:rPr lang="en-CA" sz="1000" dirty="0">
-                <a:solidFill>
-                  <a:schemeClr val="accent1">
-                    <a:lumMod val="50000"/>
-                  </a:schemeClr>
-                </a:solidFill>
-              </a:rPr>
-              <a:t>				          impervious</a:t>
-            </a:r>
-          </a:p>
-        </p:txBody>
-      </p:sp>
-      <p:grpSp>
-        <p:nvGrpSpPr>
-          <p:cNvPr id="4" name="Group 3">
-            <a:extLst>
-              <a:ext uri="{FF2B5EF4-FFF2-40B4-BE49-F238E27FC236}">
-                <a16:creationId xmlns:a16="http://schemas.microsoft.com/office/drawing/2014/main" id="{FBA1BDFC-F592-420E-9DC8-342C0BF0A6BB}"/>
-              </a:ext>
-            </a:extLst>
-          </p:cNvPr>
-          <p:cNvGrpSpPr/>
-          <p:nvPr/>
-        </p:nvGrpSpPr>
-        <p:grpSpPr>
-          <a:xfrm>
-            <a:off x="814551" y="2412124"/>
-            <a:ext cx="4795816" cy="1759825"/>
-            <a:chOff x="814551" y="2921414"/>
-            <a:chExt cx="4795816" cy="1250535"/>
-          </a:xfrm>
-        </p:grpSpPr>
-        <p:sp>
-          <p:nvSpPr>
-            <p:cNvPr id="17" name="Rectangle 16">
-              <a:extLst>
-                <a:ext uri="{FF2B5EF4-FFF2-40B4-BE49-F238E27FC236}">
-                  <a16:creationId xmlns:a16="http://schemas.microsoft.com/office/drawing/2014/main" id="{3293A71E-A64D-403D-ABFB-464262BB61E9}"/>
-                </a:ext>
-              </a:extLst>
-            </p:cNvPr>
-            <p:cNvSpPr/>
-            <p:nvPr/>
-          </p:nvSpPr>
-          <p:spPr>
-            <a:xfrm>
-              <a:off x="814551" y="2921415"/>
-              <a:ext cx="959069" cy="1250534"/>
-            </a:xfrm>
-            <a:prstGeom prst="rect">
-              <a:avLst/>
-            </a:prstGeom>
-            <a:noFill/>
-          </p:spPr>
-          <p:style>
-            <a:lnRef idx="2">
-              <a:schemeClr val="accent1">
-                <a:shade val="50000"/>
-              </a:schemeClr>
-            </a:lnRef>
-            <a:fillRef idx="1">
-              <a:schemeClr val="accent1"/>
-            </a:fillRef>
-            <a:effectRef idx="0">
-              <a:schemeClr val="accent1"/>
-            </a:effectRef>
-            <a:fontRef idx="minor">
-              <a:schemeClr val="lt1"/>
-            </a:fontRef>
-          </p:style>
-          <p:txBody>
-            <a:bodyPr rtlCol="0" anchor="ctr"/>
-            <a:lstStyle/>
-            <a:p>
-              <a:pPr algn="ctr"/>
-              <a:endParaRPr lang="en-CA"/>
-            </a:p>
-          </p:txBody>
-        </p:sp>
-        <p:sp>
-          <p:nvSpPr>
-            <p:cNvPr id="20" name="Rectangle 19">
-              <a:extLst>
-                <a:ext uri="{FF2B5EF4-FFF2-40B4-BE49-F238E27FC236}">
-                  <a16:creationId xmlns:a16="http://schemas.microsoft.com/office/drawing/2014/main" id="{F63A5048-A92D-43C4-82FF-B985B834CFE0}"/>
-                </a:ext>
-              </a:extLst>
-            </p:cNvPr>
-            <p:cNvSpPr/>
-            <p:nvPr/>
-          </p:nvSpPr>
-          <p:spPr>
-            <a:xfrm>
-              <a:off x="1776247" y="2921414"/>
-              <a:ext cx="959069" cy="1250534"/>
-            </a:xfrm>
-            <a:prstGeom prst="rect">
-              <a:avLst/>
-            </a:prstGeom>
-            <a:noFill/>
-          </p:spPr>
-          <p:style>
-            <a:lnRef idx="2">
-              <a:schemeClr val="accent1">
-                <a:shade val="50000"/>
-              </a:schemeClr>
-            </a:lnRef>
-            <a:fillRef idx="1">
-              <a:schemeClr val="accent1"/>
-            </a:fillRef>
-            <a:effectRef idx="0">
-              <a:schemeClr val="accent1"/>
-            </a:effectRef>
-            <a:fontRef idx="minor">
-              <a:schemeClr val="lt1"/>
-            </a:fontRef>
-          </p:style>
-          <p:txBody>
-            <a:bodyPr rtlCol="0" anchor="ctr"/>
-            <a:lstStyle/>
-            <a:p>
-              <a:pPr algn="ctr"/>
-              <a:endParaRPr lang="en-CA"/>
-            </a:p>
-          </p:txBody>
-        </p:sp>
-        <p:sp>
-          <p:nvSpPr>
-            <p:cNvPr id="21" name="Rectangle 20">
-              <a:extLst>
-                <a:ext uri="{FF2B5EF4-FFF2-40B4-BE49-F238E27FC236}">
-                  <a16:creationId xmlns:a16="http://schemas.microsoft.com/office/drawing/2014/main" id="{E9DDBBFA-FD30-431F-842E-A4791FC6F664}"/>
-                </a:ext>
-              </a:extLst>
-            </p:cNvPr>
-            <p:cNvSpPr/>
-            <p:nvPr/>
-          </p:nvSpPr>
-          <p:spPr>
-            <a:xfrm>
-              <a:off x="2736258" y="2921414"/>
-              <a:ext cx="959069" cy="1250534"/>
-            </a:xfrm>
-            <a:prstGeom prst="rect">
-              <a:avLst/>
-            </a:prstGeom>
-            <a:noFill/>
-          </p:spPr>
-          <p:style>
-            <a:lnRef idx="2">
-              <a:schemeClr val="accent1">
-                <a:shade val="50000"/>
-              </a:schemeClr>
-            </a:lnRef>
-            <a:fillRef idx="1">
-              <a:schemeClr val="accent1"/>
-            </a:fillRef>
-            <a:effectRef idx="0">
-              <a:schemeClr val="accent1"/>
-            </a:effectRef>
-            <a:fontRef idx="minor">
-              <a:schemeClr val="lt1"/>
-            </a:fontRef>
-          </p:style>
-          <p:txBody>
-            <a:bodyPr rtlCol="0" anchor="ctr"/>
-            <a:lstStyle/>
-            <a:p>
-              <a:pPr algn="ctr"/>
-              <a:endParaRPr lang="en-CA"/>
-            </a:p>
-          </p:txBody>
-        </p:sp>
-        <p:sp>
-          <p:nvSpPr>
-            <p:cNvPr id="22" name="Rectangle 21">
-              <a:extLst>
-                <a:ext uri="{FF2B5EF4-FFF2-40B4-BE49-F238E27FC236}">
-                  <a16:creationId xmlns:a16="http://schemas.microsoft.com/office/drawing/2014/main" id="{F48F762A-DC5B-4DB3-9393-D78E6F1441B9}"/>
-                </a:ext>
-              </a:extLst>
-            </p:cNvPr>
-            <p:cNvSpPr/>
-            <p:nvPr/>
-          </p:nvSpPr>
-          <p:spPr>
-            <a:xfrm>
-              <a:off x="3695327" y="2921414"/>
-              <a:ext cx="959069" cy="1250534"/>
-            </a:xfrm>
-            <a:prstGeom prst="rect">
-              <a:avLst/>
-            </a:prstGeom>
-            <a:noFill/>
-          </p:spPr>
-          <p:style>
-            <a:lnRef idx="2">
-              <a:schemeClr val="accent1">
-                <a:shade val="50000"/>
-              </a:schemeClr>
-            </a:lnRef>
-            <a:fillRef idx="1">
-              <a:schemeClr val="accent1"/>
-            </a:fillRef>
-            <a:effectRef idx="0">
-              <a:schemeClr val="accent1"/>
-            </a:effectRef>
-            <a:fontRef idx="minor">
-              <a:schemeClr val="lt1"/>
-            </a:fontRef>
-          </p:style>
-          <p:txBody>
-            <a:bodyPr rtlCol="0" anchor="ctr"/>
-            <a:lstStyle/>
-            <a:p>
-              <a:pPr algn="ctr"/>
-              <a:endParaRPr lang="en-CA"/>
-            </a:p>
-          </p:txBody>
-        </p:sp>
-        <p:sp>
-          <p:nvSpPr>
-            <p:cNvPr id="23" name="Rectangle 22">
-              <a:extLst>
-                <a:ext uri="{FF2B5EF4-FFF2-40B4-BE49-F238E27FC236}">
-                  <a16:creationId xmlns:a16="http://schemas.microsoft.com/office/drawing/2014/main" id="{458C57E0-157B-405D-842A-AFC227B8AE66}"/>
-                </a:ext>
-              </a:extLst>
-            </p:cNvPr>
-            <p:cNvSpPr/>
-            <p:nvPr/>
-          </p:nvSpPr>
-          <p:spPr>
-            <a:xfrm>
-              <a:off x="4651298" y="2921414"/>
-              <a:ext cx="959069" cy="1250534"/>
-            </a:xfrm>
-            <a:prstGeom prst="rect">
-              <a:avLst/>
-            </a:prstGeom>
-            <a:noFill/>
-          </p:spPr>
-          <p:style>
-            <a:lnRef idx="2">
-              <a:schemeClr val="accent1">
-                <a:shade val="50000"/>
-              </a:schemeClr>
-            </a:lnRef>
-            <a:fillRef idx="1">
-              <a:schemeClr val="accent1"/>
-            </a:fillRef>
-            <a:effectRef idx="0">
-              <a:schemeClr val="accent1"/>
-            </a:effectRef>
-            <a:fontRef idx="minor">
-              <a:schemeClr val="lt1"/>
-            </a:fontRef>
-          </p:style>
-          <p:txBody>
-            <a:bodyPr rtlCol="0" anchor="ctr"/>
-            <a:lstStyle/>
-            <a:p>
-              <a:pPr algn="ctr"/>
-              <a:endParaRPr lang="en-CA"/>
-            </a:p>
-          </p:txBody>
-        </p:sp>
-      </p:grpSp>
-      <p:sp>
-        <p:nvSpPr>
-          <p:cNvPr id="30" name="TextBox 29">
-            <a:extLst>
-              <a:ext uri="{FF2B5EF4-FFF2-40B4-BE49-F238E27FC236}">
-                <a16:creationId xmlns:a16="http://schemas.microsoft.com/office/drawing/2014/main" id="{3BA8F264-D974-46DB-A91F-DA4DBE11A6FD}"/>
-              </a:ext>
-            </a:extLst>
-          </p:cNvPr>
-          <p:cNvSpPr txBox="1"/>
-          <p:nvPr/>
-        </p:nvSpPr>
-        <p:spPr>
-          <a:xfrm>
-            <a:off x="5610367" y="2484247"/>
-            <a:ext cx="3762233" cy="400110"/>
-          </a:xfrm>
-          <a:prstGeom prst="rect">
-            <a:avLst/>
-          </a:prstGeom>
-          <a:solidFill>
-            <a:srgbClr val="FFFFFF"/>
-          </a:solidFill>
-        </p:spPr>
-        <p:txBody>
-          <a:bodyPr wrap="square" rtlCol="0">
-            <a:spAutoFit/>
-          </a:bodyPr>
-          <a:lstStyle/>
-          <a:p>
-            <a:r>
-              <a:rPr lang="en-CA" sz="1000" dirty="0">
-                <a:solidFill>
-                  <a:schemeClr val="accent1">
-                    <a:lumMod val="50000"/>
-                  </a:schemeClr>
-                </a:solidFill>
-              </a:rPr>
-              <a:t>       Needleleaf	             Broadleaf	               Crops	            Grass 	</a:t>
-            </a:r>
-          </a:p>
-        </p:txBody>
-      </p:sp>
-      <p:grpSp>
-        <p:nvGrpSpPr>
-          <p:cNvPr id="31" name="Group 30">
-            <a:extLst>
-              <a:ext uri="{FF2B5EF4-FFF2-40B4-BE49-F238E27FC236}">
-                <a16:creationId xmlns:a16="http://schemas.microsoft.com/office/drawing/2014/main" id="{EC7D8457-7C1A-4631-9848-E807B8FB9D40}"/>
-              </a:ext>
-            </a:extLst>
-          </p:cNvPr>
-          <p:cNvGrpSpPr/>
-          <p:nvPr/>
-        </p:nvGrpSpPr>
-        <p:grpSpPr>
-          <a:xfrm>
-            <a:off x="5612994" y="2412124"/>
-            <a:ext cx="3767676" cy="1759825"/>
-            <a:chOff x="814551" y="2921414"/>
-            <a:chExt cx="3767676" cy="1250535"/>
-          </a:xfrm>
-        </p:grpSpPr>
-        <p:sp>
-          <p:nvSpPr>
-            <p:cNvPr id="32" name="Rectangle 31">
-              <a:extLst>
-                <a:ext uri="{FF2B5EF4-FFF2-40B4-BE49-F238E27FC236}">
-                  <a16:creationId xmlns:a16="http://schemas.microsoft.com/office/drawing/2014/main" id="{A759CEA6-B18F-4C01-9B4C-398A72315D69}"/>
-                </a:ext>
-              </a:extLst>
-            </p:cNvPr>
-            <p:cNvSpPr/>
-            <p:nvPr/>
-          </p:nvSpPr>
-          <p:spPr>
-            <a:xfrm>
-              <a:off x="814551" y="2921415"/>
-              <a:ext cx="1189827" cy="1250534"/>
-            </a:xfrm>
-            <a:prstGeom prst="rect">
-              <a:avLst/>
-            </a:prstGeom>
-            <a:noFill/>
-          </p:spPr>
-          <p:style>
-            <a:lnRef idx="2">
-              <a:schemeClr val="accent1">
-                <a:shade val="50000"/>
-              </a:schemeClr>
-            </a:lnRef>
-            <a:fillRef idx="1">
-              <a:schemeClr val="accent1"/>
-            </a:fillRef>
-            <a:effectRef idx="0">
-              <a:schemeClr val="accent1"/>
-            </a:effectRef>
-            <a:fontRef idx="minor">
-              <a:schemeClr val="lt1"/>
-            </a:fontRef>
-          </p:style>
-          <p:txBody>
-            <a:bodyPr rtlCol="0" anchor="ctr"/>
-            <a:lstStyle/>
-            <a:p>
-              <a:pPr algn="ctr"/>
-              <a:endParaRPr lang="en-CA"/>
-            </a:p>
-          </p:txBody>
-        </p:sp>
-        <p:sp>
-          <p:nvSpPr>
-            <p:cNvPr id="33" name="Rectangle 32">
-              <a:extLst>
-                <a:ext uri="{FF2B5EF4-FFF2-40B4-BE49-F238E27FC236}">
-                  <a16:creationId xmlns:a16="http://schemas.microsoft.com/office/drawing/2014/main" id="{BD9D0EF4-55D7-4CB9-AF79-F856D2CD0D8E}"/>
-                </a:ext>
-              </a:extLst>
-            </p:cNvPr>
-            <p:cNvSpPr/>
-            <p:nvPr/>
-          </p:nvSpPr>
-          <p:spPr>
-            <a:xfrm>
-              <a:off x="2004378" y="2921414"/>
-              <a:ext cx="959069" cy="1250534"/>
-            </a:xfrm>
-            <a:prstGeom prst="rect">
-              <a:avLst/>
-            </a:prstGeom>
-            <a:noFill/>
-          </p:spPr>
-          <p:style>
-            <a:lnRef idx="2">
-              <a:schemeClr val="accent1">
-                <a:shade val="50000"/>
-              </a:schemeClr>
-            </a:lnRef>
-            <a:fillRef idx="1">
-              <a:schemeClr val="accent1"/>
-            </a:fillRef>
-            <a:effectRef idx="0">
-              <a:schemeClr val="accent1"/>
-            </a:effectRef>
-            <a:fontRef idx="minor">
-              <a:schemeClr val="lt1"/>
-            </a:fontRef>
-          </p:style>
-          <p:txBody>
-            <a:bodyPr rtlCol="0" anchor="ctr"/>
-            <a:lstStyle/>
-            <a:p>
-              <a:pPr algn="ctr"/>
-              <a:endParaRPr lang="en-CA"/>
-            </a:p>
-          </p:txBody>
-        </p:sp>
-        <p:sp>
-          <p:nvSpPr>
-            <p:cNvPr id="34" name="Rectangle 33">
-              <a:extLst>
-                <a:ext uri="{FF2B5EF4-FFF2-40B4-BE49-F238E27FC236}">
-                  <a16:creationId xmlns:a16="http://schemas.microsoft.com/office/drawing/2014/main" id="{2D3EA1F9-6701-4323-B577-65E0AB3439DA}"/>
-                </a:ext>
-              </a:extLst>
-            </p:cNvPr>
-            <p:cNvSpPr/>
-            <p:nvPr/>
-          </p:nvSpPr>
-          <p:spPr>
-            <a:xfrm>
-              <a:off x="2960350" y="2921414"/>
-              <a:ext cx="890844" cy="1250534"/>
-            </a:xfrm>
-            <a:prstGeom prst="rect">
-              <a:avLst/>
-            </a:prstGeom>
-            <a:noFill/>
-          </p:spPr>
-          <p:style>
-            <a:lnRef idx="2">
-              <a:schemeClr val="accent1">
-                <a:shade val="50000"/>
-              </a:schemeClr>
-            </a:lnRef>
-            <a:fillRef idx="1">
-              <a:schemeClr val="accent1"/>
-            </a:fillRef>
-            <a:effectRef idx="0">
-              <a:schemeClr val="accent1"/>
-            </a:effectRef>
-            <a:fontRef idx="minor">
-              <a:schemeClr val="lt1"/>
-            </a:fontRef>
-          </p:style>
-          <p:txBody>
-            <a:bodyPr rtlCol="0" anchor="ctr"/>
-            <a:lstStyle/>
-            <a:p>
-              <a:pPr algn="ctr"/>
-              <a:endParaRPr lang="en-CA"/>
-            </a:p>
-          </p:txBody>
-        </p:sp>
-        <p:sp>
-          <p:nvSpPr>
-            <p:cNvPr id="35" name="Rectangle 34">
-              <a:extLst>
-                <a:ext uri="{FF2B5EF4-FFF2-40B4-BE49-F238E27FC236}">
-                  <a16:creationId xmlns:a16="http://schemas.microsoft.com/office/drawing/2014/main" id="{E298F446-43CA-48F9-A9D7-A488A6C35B04}"/>
-                </a:ext>
-              </a:extLst>
-            </p:cNvPr>
-            <p:cNvSpPr/>
-            <p:nvPr/>
-          </p:nvSpPr>
-          <p:spPr>
-            <a:xfrm>
-              <a:off x="3852512" y="2921414"/>
-              <a:ext cx="729715" cy="1250534"/>
-            </a:xfrm>
-            <a:prstGeom prst="rect">
-              <a:avLst/>
-            </a:prstGeom>
-            <a:noFill/>
-          </p:spPr>
-          <p:style>
-            <a:lnRef idx="2">
-              <a:schemeClr val="accent1">
-                <a:shade val="50000"/>
-              </a:schemeClr>
-            </a:lnRef>
-            <a:fillRef idx="1">
-              <a:schemeClr val="accent1"/>
-            </a:fillRef>
-            <a:effectRef idx="0">
-              <a:schemeClr val="accent1"/>
-            </a:effectRef>
-            <a:fontRef idx="minor">
-              <a:schemeClr val="lt1"/>
-            </a:fontRef>
-          </p:style>
-          <p:txBody>
-            <a:bodyPr rtlCol="0" anchor="ctr"/>
-            <a:lstStyle/>
-            <a:p>
-              <a:pPr algn="ctr"/>
-              <a:endParaRPr lang="en-CA"/>
-            </a:p>
-          </p:txBody>
-        </p:sp>
-      </p:grpSp>
-    </p:spTree>
-    <p:extLst>
-      <p:ext uri="{BB962C8B-B14F-4D97-AF65-F5344CB8AC3E}">
-        <p14:creationId xmlns:p14="http://schemas.microsoft.com/office/powerpoint/2010/main" val="2347818202"/>
-      </p:ext>
-    </p:extLst>
-  </p:cSld>
-  <p:clrMapOvr>
-    <a:masterClrMapping/>
-  </p:clrMapOvr>
-</p:sld>
-</file>
-
 <file path=ppt/theme/theme1.xml><?xml version="1.0" encoding="utf-8"?>
 <a:theme xmlns:a="http://schemas.openxmlformats.org/drawingml/2006/main" name="Office Theme">
   <a:themeElements>
@@ -6827,10 +7594,274 @@
 </a:theme>
 </file>
 
+<file path=ppt/theme/theme2.xml><?xml version="1.0" encoding="utf-8"?>
+<a:theme xmlns:a="http://schemas.openxmlformats.org/drawingml/2006/main" name="Office Theme">
+  <a:themeElements>
+    <a:clrScheme name="Office">
+      <a:dk1>
+        <a:sysClr val="windowText" lastClr="000000"/>
+      </a:dk1>
+      <a:lt1>
+        <a:sysClr val="window" lastClr="FFFFFF"/>
+      </a:lt1>
+      <a:dk2>
+        <a:srgbClr val="44546A"/>
+      </a:dk2>
+      <a:lt2>
+        <a:srgbClr val="E7E6E6"/>
+      </a:lt2>
+      <a:accent1>
+        <a:srgbClr val="5B9BD5"/>
+      </a:accent1>
+      <a:accent2>
+        <a:srgbClr val="ED7D31"/>
+      </a:accent2>
+      <a:accent3>
+        <a:srgbClr val="A5A5A5"/>
+      </a:accent3>
+      <a:accent4>
+        <a:srgbClr val="FFC000"/>
+      </a:accent4>
+      <a:accent5>
+        <a:srgbClr val="4472C4"/>
+      </a:accent5>
+      <a:accent6>
+        <a:srgbClr val="70AD47"/>
+      </a:accent6>
+      <a:hlink>
+        <a:srgbClr val="0563C1"/>
+      </a:hlink>
+      <a:folHlink>
+        <a:srgbClr val="954F72"/>
+      </a:folHlink>
+    </a:clrScheme>
+    <a:fontScheme name="Office">
+      <a:majorFont>
+        <a:latin typeface="Calibri Light" panose="020F0302020204030204"/>
+        <a:ea typeface=""/>
+        <a:cs typeface=""/>
+        <a:font script="Jpan" typeface="游ゴシック Light"/>
+        <a:font script="Hang" typeface="맑은 고딕"/>
+        <a:font script="Hans" typeface="等线 Light"/>
+        <a:font script="Hant" typeface="新細明體"/>
+        <a:font script="Arab" typeface="Times New Roman"/>
+        <a:font script="Hebr" typeface="Times New Roman"/>
+        <a:font script="Thai" typeface="Angsana New"/>
+        <a:font script="Ethi" typeface="Nyala"/>
+        <a:font script="Beng" typeface="Vrinda"/>
+        <a:font script="Gujr" typeface="Shruti"/>
+        <a:font script="Khmr" typeface="MoolBoran"/>
+        <a:font script="Knda" typeface="Tunga"/>
+        <a:font script="Guru" typeface="Raavi"/>
+        <a:font script="Cans" typeface="Euphemia"/>
+        <a:font script="Cher" typeface="Plantagenet Cherokee"/>
+        <a:font script="Yiii" typeface="Microsoft Yi Baiti"/>
+        <a:font script="Tibt" typeface="Microsoft Himalaya"/>
+        <a:font script="Thaa" typeface="MV Boli"/>
+        <a:font script="Deva" typeface="Mangal"/>
+        <a:font script="Telu" typeface="Gautami"/>
+        <a:font script="Taml" typeface="Latha"/>
+        <a:font script="Syrc" typeface="Estrangelo Edessa"/>
+        <a:font script="Orya" typeface="Kalinga"/>
+        <a:font script="Mlym" typeface="Kartika"/>
+        <a:font script="Laoo" typeface="DokChampa"/>
+        <a:font script="Sinh" typeface="Iskoola Pota"/>
+        <a:font script="Mong" typeface="Mongolian Baiti"/>
+        <a:font script="Viet" typeface="Times New Roman"/>
+        <a:font script="Uigh" typeface="Microsoft Uighur"/>
+        <a:font script="Geor" typeface="Sylfaen"/>
+      </a:majorFont>
+      <a:minorFont>
+        <a:latin typeface="Calibri" panose="020F0502020204030204"/>
+        <a:ea typeface=""/>
+        <a:cs typeface=""/>
+        <a:font script="Jpan" typeface="游ゴシック"/>
+        <a:font script="Hang" typeface="맑은 고딕"/>
+        <a:font script="Hans" typeface="等线"/>
+        <a:font script="Hant" typeface="新細明體"/>
+        <a:font script="Arab" typeface="Arial"/>
+        <a:font script="Hebr" typeface="Arial"/>
+        <a:font script="Thai" typeface="Cordia New"/>
+        <a:font script="Ethi" typeface="Nyala"/>
+        <a:font script="Beng" typeface="Vrinda"/>
+        <a:font script="Gujr" typeface="Shruti"/>
+        <a:font script="Khmr" typeface="DaunPenh"/>
+        <a:font script="Knda" typeface="Tunga"/>
+        <a:font script="Guru" typeface="Raavi"/>
+        <a:font script="Cans" typeface="Euphemia"/>
+        <a:font script="Cher" typeface="Plantagenet Cherokee"/>
+        <a:font script="Yiii" typeface="Microsoft Yi Baiti"/>
+        <a:font script="Tibt" typeface="Microsoft Himalaya"/>
+        <a:font script="Thaa" typeface="MV Boli"/>
+        <a:font script="Deva" typeface="Mangal"/>
+        <a:font script="Telu" typeface="Gautami"/>
+        <a:font script="Taml" typeface="Latha"/>
+        <a:font script="Syrc" typeface="Estrangelo Edessa"/>
+        <a:font script="Orya" typeface="Kalinga"/>
+        <a:font script="Mlym" typeface="Kartika"/>
+        <a:font script="Laoo" typeface="DokChampa"/>
+        <a:font script="Sinh" typeface="Iskoola Pota"/>
+        <a:font script="Mong" typeface="Mongolian Baiti"/>
+        <a:font script="Viet" typeface="Arial"/>
+        <a:font script="Uigh" typeface="Microsoft Uighur"/>
+        <a:font script="Geor" typeface="Sylfaen"/>
+      </a:minorFont>
+    </a:fontScheme>
+    <a:fmtScheme name="Office">
+      <a:fillStyleLst>
+        <a:solidFill>
+          <a:schemeClr val="phClr"/>
+        </a:solidFill>
+        <a:gradFill rotWithShape="1">
+          <a:gsLst>
+            <a:gs pos="0">
+              <a:schemeClr val="phClr">
+                <a:lumMod val="110000"/>
+                <a:satMod val="105000"/>
+                <a:tint val="67000"/>
+              </a:schemeClr>
+            </a:gs>
+            <a:gs pos="50000">
+              <a:schemeClr val="phClr">
+                <a:lumMod val="105000"/>
+                <a:satMod val="103000"/>
+                <a:tint val="73000"/>
+              </a:schemeClr>
+            </a:gs>
+            <a:gs pos="100000">
+              <a:schemeClr val="phClr">
+                <a:lumMod val="105000"/>
+                <a:satMod val="109000"/>
+                <a:tint val="81000"/>
+              </a:schemeClr>
+            </a:gs>
+          </a:gsLst>
+          <a:lin ang="5400000" scaled="0"/>
+        </a:gradFill>
+        <a:gradFill rotWithShape="1">
+          <a:gsLst>
+            <a:gs pos="0">
+              <a:schemeClr val="phClr">
+                <a:satMod val="103000"/>
+                <a:lumMod val="102000"/>
+                <a:tint val="94000"/>
+              </a:schemeClr>
+            </a:gs>
+            <a:gs pos="50000">
+              <a:schemeClr val="phClr">
+                <a:satMod val="110000"/>
+                <a:lumMod val="100000"/>
+                <a:shade val="100000"/>
+              </a:schemeClr>
+            </a:gs>
+            <a:gs pos="100000">
+              <a:schemeClr val="phClr">
+                <a:lumMod val="99000"/>
+                <a:satMod val="120000"/>
+                <a:shade val="78000"/>
+              </a:schemeClr>
+            </a:gs>
+          </a:gsLst>
+          <a:lin ang="5400000" scaled="0"/>
+        </a:gradFill>
+      </a:fillStyleLst>
+      <a:lnStyleLst>
+        <a:ln w="6350" cap="flat" cmpd="sng" algn="ctr">
+          <a:solidFill>
+            <a:schemeClr val="phClr"/>
+          </a:solidFill>
+          <a:prstDash val="solid"/>
+          <a:miter lim="800000"/>
+        </a:ln>
+        <a:ln w="12700" cap="flat" cmpd="sng" algn="ctr">
+          <a:solidFill>
+            <a:schemeClr val="phClr"/>
+          </a:solidFill>
+          <a:prstDash val="solid"/>
+          <a:miter lim="800000"/>
+        </a:ln>
+        <a:ln w="19050" cap="flat" cmpd="sng" algn="ctr">
+          <a:solidFill>
+            <a:schemeClr val="phClr"/>
+          </a:solidFill>
+          <a:prstDash val="solid"/>
+          <a:miter lim="800000"/>
+        </a:ln>
+      </a:lnStyleLst>
+      <a:effectStyleLst>
+        <a:effectStyle>
+          <a:effectLst/>
+        </a:effectStyle>
+        <a:effectStyle>
+          <a:effectLst/>
+        </a:effectStyle>
+        <a:effectStyle>
+          <a:effectLst>
+            <a:outerShdw blurRad="57150" dist="19050" dir="5400000" algn="ctr" rotWithShape="0">
+              <a:srgbClr val="000000">
+                <a:alpha val="63000"/>
+              </a:srgbClr>
+            </a:outerShdw>
+          </a:effectLst>
+        </a:effectStyle>
+      </a:effectStyleLst>
+      <a:bgFillStyleLst>
+        <a:solidFill>
+          <a:schemeClr val="phClr"/>
+        </a:solidFill>
+        <a:solidFill>
+          <a:schemeClr val="phClr">
+            <a:tint val="95000"/>
+            <a:satMod val="170000"/>
+          </a:schemeClr>
+        </a:solidFill>
+        <a:gradFill rotWithShape="1">
+          <a:gsLst>
+            <a:gs pos="0">
+              <a:schemeClr val="phClr">
+                <a:tint val="93000"/>
+                <a:satMod val="150000"/>
+                <a:shade val="98000"/>
+                <a:lumMod val="102000"/>
+              </a:schemeClr>
+            </a:gs>
+            <a:gs pos="50000">
+              <a:schemeClr val="phClr">
+                <a:tint val="98000"/>
+                <a:satMod val="130000"/>
+                <a:shade val="90000"/>
+                <a:lumMod val="103000"/>
+              </a:schemeClr>
+            </a:gs>
+            <a:gs pos="100000">
+              <a:schemeClr val="phClr">
+                <a:shade val="63000"/>
+                <a:satMod val="120000"/>
+              </a:schemeClr>
+            </a:gs>
+          </a:gsLst>
+          <a:lin ang="5400000" scaled="0"/>
+        </a:gradFill>
+      </a:bgFillStyleLst>
+    </a:fmtScheme>
+  </a:themeElements>
+  <a:objectDefaults/>
+  <a:extraClrSchemeLst/>
+  <a:extLst>
+    <a:ext uri="{05A4C25C-085E-4340-85A3-A5531E510DB2}">
+      <thm15:themeFamily xmlns:thm15="http://schemas.microsoft.com/office/thememl/2012/main" name="Office Theme" id="{62F939B6-93AF-4DB8-9C6B-D6C7DFDC589F}" vid="{4A3C46E8-61CC-4603-A589-7422A47A8E4A}"/>
+    </a:ext>
+  </a:extLst>
+</a:theme>
+</file>
+
 <file path=customXml/item1.xml><?xml version="1.0" encoding="utf-8"?>
-<p:properties xmlns:p="http://schemas.microsoft.com/office/2006/metadata/properties" xmlns:xsi="http://www.w3.org/2001/XMLSchema-instance" xmlns:pc="http://schemas.microsoft.com/office/infopath/2007/PartnerControls">
-  <documentManagement/>
-</p:properties>
+<?mso-contentType ?>
+<FormTemplates xmlns="http://schemas.microsoft.com/sharepoint/v3/contenttype/forms">
+  <Display>DocumentLibraryForm</Display>
+  <Edit>DocumentLibraryForm</Edit>
+  <New>DocumentLibraryForm</New>
+</FormTemplates>
 </file>
 
 <file path=customXml/item2.xml><?xml version="1.0" encoding="utf-8"?>
@@ -7043,27 +8074,15 @@
 </file>
 
 <file path=customXml/item3.xml><?xml version="1.0" encoding="utf-8"?>
-<?mso-contentType ?>
-<FormTemplates xmlns="http://schemas.microsoft.com/sharepoint/v3/contenttype/forms">
-  <Display>DocumentLibraryForm</Display>
-  <Edit>DocumentLibraryForm</Edit>
-  <New>DocumentLibraryForm</New>
-</FormTemplates>
+<p:properties xmlns:p="http://schemas.microsoft.com/office/2006/metadata/properties" xmlns:xsi="http://www.w3.org/2001/XMLSchema-instance" xmlns:pc="http://schemas.microsoft.com/office/infopath/2007/PartnerControls">
+  <documentManagement/>
+</p:properties>
 </file>
 
 <file path=customXml/itemProps1.xml><?xml version="1.0" encoding="utf-8"?>
-<ds:datastoreItem xmlns:ds="http://schemas.openxmlformats.org/officeDocument/2006/customXml" ds:itemID="{BBAEBF7C-6D45-433A-80A1-26E4C26A4485}">
+<ds:datastoreItem xmlns:ds="http://schemas.openxmlformats.org/officeDocument/2006/customXml" ds:itemID="{0FBEFEAC-52A2-4CDA-B21A-D96CDD92773C}">
   <ds:schemaRefs>
-    <ds:schemaRef ds:uri="http://schemas.microsoft.com/office/2006/metadata/properties"/>
-    <ds:schemaRef ds:uri="617ececa-b5e3-4507-93d4-61bdda0dd2e5"/>
-    <ds:schemaRef ds:uri="4f50ba49-0a3d-4b68-8c9c-6392e65ccdfd"/>
-    <ds:schemaRef ds:uri="http://purl.org/dc/terms/"/>
-    <ds:schemaRef ds:uri="http://schemas.openxmlformats.org/package/2006/metadata/core-properties"/>
-    <ds:schemaRef ds:uri="http://purl.org/dc/dcmitype/"/>
-    <ds:schemaRef ds:uri="http://schemas.microsoft.com/office/infopath/2007/PartnerControls"/>
-    <ds:schemaRef ds:uri="http://schemas.microsoft.com/office/2006/documentManagement/types"/>
-    <ds:schemaRef ds:uri="http://purl.org/dc/elements/1.1/"/>
-    <ds:schemaRef ds:uri="http://www.w3.org/XML/1998/namespace"/>
+    <ds:schemaRef ds:uri="http://schemas.microsoft.com/sharepoint/v3/contenttype/forms"/>
   </ds:schemaRefs>
 </ds:datastoreItem>
 </file>
@@ -7088,9 +8107,18 @@
 </file>
 
 <file path=customXml/itemProps3.xml><?xml version="1.0" encoding="utf-8"?>
-<ds:datastoreItem xmlns:ds="http://schemas.openxmlformats.org/officeDocument/2006/customXml" ds:itemID="{0FBEFEAC-52A2-4CDA-B21A-D96CDD92773C}">
+<ds:datastoreItem xmlns:ds="http://schemas.openxmlformats.org/officeDocument/2006/customXml" ds:itemID="{BBAEBF7C-6D45-433A-80A1-26E4C26A4485}">
   <ds:schemaRefs>
-    <ds:schemaRef ds:uri="http://schemas.microsoft.com/sharepoint/v3/contenttype/forms"/>
+    <ds:schemaRef ds:uri="http://purl.org/dc/dcmitype/"/>
+    <ds:schemaRef ds:uri="http://schemas.microsoft.com/office/infopath/2007/PartnerControls"/>
+    <ds:schemaRef ds:uri="http://schemas.microsoft.com/office/2006/documentManagement/types"/>
+    <ds:schemaRef ds:uri="http://purl.org/dc/elements/1.1/"/>
+    <ds:schemaRef ds:uri="http://schemas.microsoft.com/office/2006/metadata/properties"/>
+    <ds:schemaRef ds:uri="617ececa-b5e3-4507-93d4-61bdda0dd2e5"/>
+    <ds:schemaRef ds:uri="4f50ba49-0a3d-4b68-8c9c-6392e65ccdfd"/>
+    <ds:schemaRef ds:uri="http://purl.org/dc/terms/"/>
+    <ds:schemaRef ds:uri="http://schemas.openxmlformats.org/package/2006/metadata/core-properties"/>
+    <ds:schemaRef ds:uri="http://www.w3.org/XML/1998/namespace"/>
   </ds:schemaRefs>
 </ds:datastoreItem>
 </file>
</xml_diff>

<commit_message>
added r1606 and updated files
</commit_message>
<xml_diff>
--- a/Presentations/White Gull Creek MESH Point Scale Configuration.pptx
+++ b/Presentations/White Gull Creek MESH Point Scale Configuration.pptx
@@ -210,7 +210,7 @@
           <a:p>
             <a:fld id="{1A552B27-DB50-4F36-8DFC-AF516C2E42A6}" type="datetimeFigureOut">
               <a:rPr lang="en-CA" smtClean="0"/>
-              <a:t>2020-01-20</a:t>
+              <a:t>2020-01-22</a:t>
             </a:fld>
             <a:endParaRPr lang="en-CA"/>
           </a:p>
@@ -827,7 +827,7 @@
           <a:p>
             <a:fld id="{A176C1FD-5F51-4E9E-88BE-6218115F035A}" type="datetimeFigureOut">
               <a:rPr lang="en-CA" smtClean="0"/>
-              <a:t>2020-01-20</a:t>
+              <a:t>2020-01-22</a:t>
             </a:fld>
             <a:endParaRPr lang="en-CA"/>
           </a:p>
@@ -997,7 +997,7 @@
           <a:p>
             <a:fld id="{A176C1FD-5F51-4E9E-88BE-6218115F035A}" type="datetimeFigureOut">
               <a:rPr lang="en-CA" smtClean="0"/>
-              <a:t>2020-01-20</a:t>
+              <a:t>2020-01-22</a:t>
             </a:fld>
             <a:endParaRPr lang="en-CA"/>
           </a:p>
@@ -1177,7 +1177,7 @@
           <a:p>
             <a:fld id="{A176C1FD-5F51-4E9E-88BE-6218115F035A}" type="datetimeFigureOut">
               <a:rPr lang="en-CA" smtClean="0"/>
-              <a:t>2020-01-20</a:t>
+              <a:t>2020-01-22</a:t>
             </a:fld>
             <a:endParaRPr lang="en-CA"/>
           </a:p>
@@ -1347,7 +1347,7 @@
           <a:p>
             <a:fld id="{A176C1FD-5F51-4E9E-88BE-6218115F035A}" type="datetimeFigureOut">
               <a:rPr lang="en-CA" smtClean="0"/>
-              <a:t>2020-01-20</a:t>
+              <a:t>2020-01-22</a:t>
             </a:fld>
             <a:endParaRPr lang="en-CA"/>
           </a:p>
@@ -1593,7 +1593,7 @@
           <a:p>
             <a:fld id="{A176C1FD-5F51-4E9E-88BE-6218115F035A}" type="datetimeFigureOut">
               <a:rPr lang="en-CA" smtClean="0"/>
-              <a:t>2020-01-20</a:t>
+              <a:t>2020-01-22</a:t>
             </a:fld>
             <a:endParaRPr lang="en-CA"/>
           </a:p>
@@ -1825,7 +1825,7 @@
           <a:p>
             <a:fld id="{A176C1FD-5F51-4E9E-88BE-6218115F035A}" type="datetimeFigureOut">
               <a:rPr lang="en-CA" smtClean="0"/>
-              <a:t>2020-01-20</a:t>
+              <a:t>2020-01-22</a:t>
             </a:fld>
             <a:endParaRPr lang="en-CA"/>
           </a:p>
@@ -2192,7 +2192,7 @@
           <a:p>
             <a:fld id="{A176C1FD-5F51-4E9E-88BE-6218115F035A}" type="datetimeFigureOut">
               <a:rPr lang="en-CA" smtClean="0"/>
-              <a:t>2020-01-20</a:t>
+              <a:t>2020-01-22</a:t>
             </a:fld>
             <a:endParaRPr lang="en-CA"/>
           </a:p>
@@ -2310,7 +2310,7 @@
           <a:p>
             <a:fld id="{A176C1FD-5F51-4E9E-88BE-6218115F035A}" type="datetimeFigureOut">
               <a:rPr lang="en-CA" smtClean="0"/>
-              <a:t>2020-01-20</a:t>
+              <a:t>2020-01-22</a:t>
             </a:fld>
             <a:endParaRPr lang="en-CA"/>
           </a:p>
@@ -2405,7 +2405,7 @@
           <a:p>
             <a:fld id="{A176C1FD-5F51-4E9E-88BE-6218115F035A}" type="datetimeFigureOut">
               <a:rPr lang="en-CA" smtClean="0"/>
-              <a:t>2020-01-20</a:t>
+              <a:t>2020-01-22</a:t>
             </a:fld>
             <a:endParaRPr lang="en-CA"/>
           </a:p>
@@ -2682,7 +2682,7 @@
           <a:p>
             <a:fld id="{A176C1FD-5F51-4E9E-88BE-6218115F035A}" type="datetimeFigureOut">
               <a:rPr lang="en-CA" smtClean="0"/>
-              <a:t>2020-01-20</a:t>
+              <a:t>2020-01-22</a:t>
             </a:fld>
             <a:endParaRPr lang="en-CA"/>
           </a:p>
@@ -2935,7 +2935,7 @@
           <a:p>
             <a:fld id="{A176C1FD-5F51-4E9E-88BE-6218115F035A}" type="datetimeFigureOut">
               <a:rPr lang="en-CA" smtClean="0"/>
-              <a:t>2020-01-20</a:t>
+              <a:t>2020-01-22</a:t>
             </a:fld>
             <a:endParaRPr lang="en-CA"/>
           </a:p>
@@ -3148,7 +3148,7 @@
           <a:p>
             <a:fld id="{A176C1FD-5F51-4E9E-88BE-6218115F035A}" type="datetimeFigureOut">
               <a:rPr lang="en-CA" smtClean="0"/>
-              <a:t>2020-01-20</a:t>
+              <a:t>2020-01-22</a:t>
             </a:fld>
             <a:endParaRPr lang="en-CA"/>
           </a:p>
@@ -5722,11 +5722,7 @@
           <a:p>
             <a:r>
               <a:rPr lang="en-US" dirty="0" smtClean="0"/>
-              <a:t>Familiarize yourself with the </a:t>
-            </a:r>
-            <a:r>
-              <a:rPr lang="en-US" dirty="0" smtClean="0"/>
-              <a:t>site</a:t>
+              <a:t>Familiarize yourself with the site</a:t>
             </a:r>
           </a:p>
           <a:p>
@@ -5823,7 +5819,7 @@
         </p:spPr>
         <p:txBody>
           <a:bodyPr>
-            <a:normAutofit fontScale="92500" lnSpcReduction="10000"/>
+            <a:normAutofit fontScale="92500" lnSpcReduction="20000"/>
           </a:bodyPr>
           <a:lstStyle/>
           <a:p>
@@ -5853,18 +5849,44 @@
             <a:pPr lvl="1"/>
             <a:r>
               <a:rPr lang="en-US" dirty="0" smtClean="0"/>
-              <a:t>Use the newest interim release of MESH (r1593) (</a:t>
-            </a:r>
-            <a:r>
-              <a:rPr lang="en-CA" sz="1800" dirty="0" smtClean="0">
+              <a:t>Use the newest interim release of MESH (</a:t>
+            </a:r>
+            <a:r>
+              <a:rPr lang="en-US" dirty="0" smtClean="0"/>
+              <a:t>r1593, or r1606 if using .met files)</a:t>
+            </a:r>
+          </a:p>
+          <a:p>
+            <a:pPr lvl="2"/>
+            <a:r>
+              <a:rPr lang="en-CA" sz="1400" dirty="0" smtClean="0">
                 <a:hlinkClick r:id="rId2"/>
               </a:rPr>
-              <a:t>https://wiki.usask.ca/display/MESH/Interim+releases</a:t>
-            </a:r>
-            <a:r>
-              <a:rPr lang="en-CA" dirty="0" smtClean="0"/>
-              <a:t>)</a:t>
-            </a:r>
+              <a:t>https</a:t>
+            </a:r>
+            <a:r>
+              <a:rPr lang="en-CA" sz="1400" dirty="0" smtClean="0">
+                <a:hlinkClick r:id="rId2"/>
+              </a:rPr>
+              <a:t>://</a:t>
+            </a:r>
+            <a:r>
+              <a:rPr lang="en-CA" sz="1400" dirty="0" smtClean="0">
+                <a:hlinkClick r:id="rId2"/>
+              </a:rPr>
+              <a:t>wiki.usask.ca/display/MESH/Interim+releases</a:t>
+            </a:r>
+            <a:endParaRPr lang="en-CA" dirty="0" smtClean="0"/>
+          </a:p>
+          <a:p>
+            <a:pPr lvl="2"/>
+            <a:r>
+              <a:rPr lang="en-CA" sz="1400" dirty="0">
+                <a:hlinkClick r:id="rId3"/>
+              </a:rPr>
+              <a:t>https://wiki.usask.ca/pages/viewpage.action?pageId=1685587179</a:t>
+            </a:r>
+            <a:endParaRPr lang="en-CA" sz="1400" dirty="0"/>
           </a:p>
           <a:p>
             <a:pPr lvl="1"/>
@@ -5903,7 +5925,7 @@
             </a:r>
             <a:r>
               <a:rPr lang="en-CA" sz="1900" dirty="0" smtClean="0">
-                <a:hlinkClick r:id="rId3"/>
+                <a:hlinkClick r:id="rId4"/>
               </a:rPr>
               <a:t>https://wiki.usask.ca/display/MESH/RUNMODE</a:t>
             </a:r>
@@ -5928,7 +5950,7 @@
           <p:nvPr/>
         </p:nvPicPr>
         <p:blipFill>
-          <a:blip r:embed="rId4"/>
+          <a:blip r:embed="rId5"/>
           <a:stretch>
             <a:fillRect/>
           </a:stretch>
@@ -6038,11 +6060,7 @@
           <a:p>
             <a:r>
               <a:rPr lang="en-US" dirty="0" smtClean="0"/>
-              <a:t>Prepare meteorological </a:t>
-            </a:r>
-            <a:r>
-              <a:rPr lang="en-US" dirty="0" smtClean="0"/>
-              <a:t>forcing data files</a:t>
+              <a:t>Prepare meteorological forcing data files</a:t>
             </a:r>
           </a:p>
           <a:p>
@@ -6209,19 +6227,7 @@
             <a:pPr lvl="1"/>
             <a:r>
               <a:rPr lang="en-US" dirty="0" smtClean="0"/>
-              <a:t>Additional parameters need to be defined if </a:t>
-            </a:r>
-            <a:r>
-              <a:rPr lang="en-US" dirty="0" smtClean="0"/>
-              <a:t>using PDMROF </a:t>
-            </a:r>
-            <a:r>
-              <a:rPr lang="en-US" dirty="0" smtClean="0"/>
-              <a:t>or FROZEN </a:t>
-            </a:r>
-            <a:r>
-              <a:rPr lang="en-US" dirty="0" smtClean="0"/>
-              <a:t>algorithms</a:t>
+              <a:t>Additional parameters need to be defined if using PDMROF or FROZEN algorithms</a:t>
             </a:r>
           </a:p>
           <a:p>
@@ -6248,31 +6254,15 @@
             <a:pPr lvl="1"/>
             <a:r>
               <a:rPr lang="en-US" dirty="0" smtClean="0"/>
-              <a:t>Some of </a:t>
-            </a:r>
+              <a:t>Some of the hydrology parameters in the CLASS file not used for flat CLASS</a:t>
+            </a:r>
+            <a:endParaRPr lang="en-CA" dirty="0" smtClean="0"/>
+          </a:p>
+          <a:p>
+            <a:pPr lvl="1"/>
             <a:r>
               <a:rPr lang="en-US" dirty="0" smtClean="0"/>
-              <a:t>the hydrology </a:t>
-            </a:r>
-            <a:r>
-              <a:rPr lang="en-US" dirty="0" smtClean="0"/>
-              <a:t>parameters in the CLASS file not used for flat CLASS</a:t>
-            </a:r>
-            <a:endParaRPr lang="en-CA" dirty="0" smtClean="0"/>
-          </a:p>
-          <a:p>
-            <a:pPr lvl="1"/>
-            <a:r>
-              <a:rPr lang="en-US" dirty="0" smtClean="0"/>
-              <a:t>Note the different sections of the CLASS.ini file (see </a:t>
-            </a:r>
-            <a:r>
-              <a:rPr lang="en-US" dirty="0" smtClean="0"/>
-              <a:t>future slides </a:t>
-            </a:r>
-            <a:r>
-              <a:rPr lang="en-US" dirty="0" smtClean="0"/>
-              <a:t>if needed)</a:t>
+              <a:t>Note the different sections of the CLASS.ini file (see future slides if needed)</a:t>
             </a:r>
           </a:p>
           <a:p>
@@ -6444,15 +6434,7 @@
             </a:r>
             <a:r>
               <a:rPr lang="en-US" dirty="0" smtClean="0"/>
-              <a:t> of the forcing data </a:t>
-            </a:r>
-            <a:r>
-              <a:rPr lang="en-US" dirty="0" smtClean="0"/>
-              <a:t>(which is specified </a:t>
-            </a:r>
-            <a:r>
-              <a:rPr lang="en-US" dirty="0" smtClean="0"/>
-              <a:t>in CLASS.ini)</a:t>
+              <a:t> of the forcing data (which is specified in CLASS.ini)</a:t>
             </a:r>
           </a:p>
           <a:p>
@@ -6551,13 +6533,8 @@
           <a:p>
             <a:r>
               <a:rPr lang="en-US" dirty="0" smtClean="0"/>
-              <a:t>Set up run </a:t>
-            </a:r>
-            <a:r>
-              <a:rPr lang="en-US" dirty="0" smtClean="0"/>
-              <a:t>scripts and run the model</a:t>
-            </a:r>
-            <a:endParaRPr lang="en-US" dirty="0" smtClean="0"/>
+              <a:t>Set up run scripts and run the model</a:t>
+            </a:r>
           </a:p>
           <a:p>
             <a:pPr lvl="1"/>
@@ -6585,17 +6562,8 @@
             <a:pPr lvl="2"/>
             <a:r>
               <a:rPr lang="en-US" dirty="0" smtClean="0"/>
-              <a:t>Creates </a:t>
-            </a:r>
-            <a:r>
-              <a:rPr lang="en-US" dirty="0" smtClean="0"/>
-              <a:t>a symbolic link to the driving data in the </a:t>
-            </a:r>
-            <a:r>
-              <a:rPr lang="en-US" dirty="0" smtClean="0"/>
-              <a:t>model folder</a:t>
-            </a:r>
-            <a:endParaRPr lang="en-US" dirty="0" smtClean="0"/>
+              <a:t>Creates a symbolic link to the driving data in the model folder</a:t>
+            </a:r>
           </a:p>
           <a:p>
             <a:pPr lvl="2"/>
@@ -6608,11 +6576,7 @@
             <a:pPr lvl="2"/>
             <a:r>
               <a:rPr lang="en-US" dirty="0" smtClean="0"/>
-              <a:t>Runs </a:t>
-            </a:r>
-            <a:r>
-              <a:rPr lang="en-US" dirty="0" smtClean="0"/>
-              <a:t>the model</a:t>
+              <a:t>Runs the model</a:t>
             </a:r>
           </a:p>
           <a:p>
@@ -6628,20 +6592,7 @@
                   </a:glow>
                 </a:effectLst>
               </a:rPr>
-              <a:t>Process the outputs and generate image files of the </a:t>
-            </a:r>
-            <a:r>
-              <a:rPr lang="en-US" dirty="0" smtClean="0">
-                <a:effectLst>
-                  <a:glow rad="228600">
-                    <a:schemeClr val="accent4">
-                      <a:satMod val="175000"/>
-                      <a:alpha val="40000"/>
-                    </a:schemeClr>
-                  </a:glow>
-                </a:effectLst>
-              </a:rPr>
-              <a:t>graphs (not working -&gt; issue with windows </a:t>
+              <a:t>Process the outputs and generate image files of the graphs (not working -&gt; issue with windows </a:t>
             </a:r>
             <a:r>
               <a:rPr lang="en-US" dirty="0" err="1" smtClean="0">
@@ -7856,12 +7807,9 @@
 </file>
 
 <file path=customXml/item1.xml><?xml version="1.0" encoding="utf-8"?>
-<?mso-contentType ?>
-<FormTemplates xmlns="http://schemas.microsoft.com/sharepoint/v3/contenttype/forms">
-  <Display>DocumentLibraryForm</Display>
-  <Edit>DocumentLibraryForm</Edit>
-  <New>DocumentLibraryForm</New>
-</FormTemplates>
+<p:properties xmlns:p="http://schemas.microsoft.com/office/2006/metadata/properties" xmlns:xsi="http://www.w3.org/2001/XMLSchema-instance" xmlns:pc="http://schemas.microsoft.com/office/infopath/2007/PartnerControls">
+  <documentManagement/>
+</p:properties>
 </file>
 
 <file path=customXml/item2.xml><?xml version="1.0" encoding="utf-8"?>
@@ -8074,15 +8022,27 @@
 </file>
 
 <file path=customXml/item3.xml><?xml version="1.0" encoding="utf-8"?>
-<p:properties xmlns:p="http://schemas.microsoft.com/office/2006/metadata/properties" xmlns:xsi="http://www.w3.org/2001/XMLSchema-instance" xmlns:pc="http://schemas.microsoft.com/office/infopath/2007/PartnerControls">
-  <documentManagement/>
-</p:properties>
+<?mso-contentType ?>
+<FormTemplates xmlns="http://schemas.microsoft.com/sharepoint/v3/contenttype/forms">
+  <Display>DocumentLibraryForm</Display>
+  <Edit>DocumentLibraryForm</Edit>
+  <New>DocumentLibraryForm</New>
+</FormTemplates>
 </file>
 
 <file path=customXml/itemProps1.xml><?xml version="1.0" encoding="utf-8"?>
-<ds:datastoreItem xmlns:ds="http://schemas.openxmlformats.org/officeDocument/2006/customXml" ds:itemID="{0FBEFEAC-52A2-4CDA-B21A-D96CDD92773C}">
+<ds:datastoreItem xmlns:ds="http://schemas.openxmlformats.org/officeDocument/2006/customXml" ds:itemID="{BBAEBF7C-6D45-433A-80A1-26E4C26A4485}">
   <ds:schemaRefs>
-    <ds:schemaRef ds:uri="http://schemas.microsoft.com/sharepoint/v3/contenttype/forms"/>
+    <ds:schemaRef ds:uri="http://purl.org/dc/terms/"/>
+    <ds:schemaRef ds:uri="http://schemas.openxmlformats.org/package/2006/metadata/core-properties"/>
+    <ds:schemaRef ds:uri="http://purl.org/dc/dcmitype/"/>
+    <ds:schemaRef ds:uri="http://schemas.microsoft.com/office/infopath/2007/PartnerControls"/>
+    <ds:schemaRef ds:uri="http://schemas.microsoft.com/office/2006/documentManagement/types"/>
+    <ds:schemaRef ds:uri="http://purl.org/dc/elements/1.1/"/>
+    <ds:schemaRef ds:uri="http://schemas.microsoft.com/office/2006/metadata/properties"/>
+    <ds:schemaRef ds:uri="617ececa-b5e3-4507-93d4-61bdda0dd2e5"/>
+    <ds:schemaRef ds:uri="4f50ba49-0a3d-4b68-8c9c-6392e65ccdfd"/>
+    <ds:schemaRef ds:uri="http://www.w3.org/XML/1998/namespace"/>
   </ds:schemaRefs>
 </ds:datastoreItem>
 </file>
@@ -8107,18 +8067,9 @@
 </file>
 
 <file path=customXml/itemProps3.xml><?xml version="1.0" encoding="utf-8"?>
-<ds:datastoreItem xmlns:ds="http://schemas.openxmlformats.org/officeDocument/2006/customXml" ds:itemID="{BBAEBF7C-6D45-433A-80A1-26E4C26A4485}">
+<ds:datastoreItem xmlns:ds="http://schemas.openxmlformats.org/officeDocument/2006/customXml" ds:itemID="{0FBEFEAC-52A2-4CDA-B21A-D96CDD92773C}">
   <ds:schemaRefs>
-    <ds:schemaRef ds:uri="http://purl.org/dc/dcmitype/"/>
-    <ds:schemaRef ds:uri="http://schemas.microsoft.com/office/infopath/2007/PartnerControls"/>
-    <ds:schemaRef ds:uri="http://schemas.microsoft.com/office/2006/documentManagement/types"/>
-    <ds:schemaRef ds:uri="http://purl.org/dc/elements/1.1/"/>
-    <ds:schemaRef ds:uri="http://schemas.microsoft.com/office/2006/metadata/properties"/>
-    <ds:schemaRef ds:uri="617ececa-b5e3-4507-93d4-61bdda0dd2e5"/>
-    <ds:schemaRef ds:uri="4f50ba49-0a3d-4b68-8c9c-6392e65ccdfd"/>
-    <ds:schemaRef ds:uri="http://purl.org/dc/terms/"/>
-    <ds:schemaRef ds:uri="http://schemas.openxmlformats.org/package/2006/metadata/core-properties"/>
-    <ds:schemaRef ds:uri="http://www.w3.org/XML/1998/namespace"/>
+    <ds:schemaRef ds:uri="http://schemas.microsoft.com/sharepoint/v3/contenttype/forms"/>
   </ds:schemaRefs>
 </ds:datastoreItem>
 </file>
</xml_diff>